<commit_message>
Updated lecture 2 slides
</commit_message>
<xml_diff>
--- a/lectures/2.Information.Theory.pptx
+++ b/lectures/2.Information.Theory.pptx
@@ -6,10 +6,10 @@
     <p:sldMasterId id="2147483660" r:id="rId2"/>
   </p:sldMasterIdLst>
   <p:notesMasterIdLst>
-    <p:notesMasterId r:id="rId29"/>
+    <p:notesMasterId r:id="rId32"/>
   </p:notesMasterIdLst>
   <p:handoutMasterIdLst>
-    <p:handoutMasterId r:id="rId30"/>
+    <p:handoutMasterId r:id="rId33"/>
   </p:handoutMasterIdLst>
   <p:sldIdLst>
     <p:sldId id="257" r:id="rId3"/>
@@ -35,9 +35,12 @@
     <p:sldId id="695" r:id="rId23"/>
     <p:sldId id="689" r:id="rId24"/>
     <p:sldId id="694" r:id="rId25"/>
-    <p:sldId id="697" r:id="rId26"/>
-    <p:sldId id="698" r:id="rId27"/>
-    <p:sldId id="699" r:id="rId28"/>
+    <p:sldId id="703" r:id="rId26"/>
+    <p:sldId id="704" r:id="rId27"/>
+    <p:sldId id="705" r:id="rId28"/>
+    <p:sldId id="697" r:id="rId29"/>
+    <p:sldId id="698" r:id="rId30"/>
+    <p:sldId id="699" r:id="rId31"/>
   </p:sldIdLst>
   <p:sldSz cx="9144000" cy="6858000" type="screen4x3"/>
   <p:notesSz cx="6858000" cy="9144000"/>
@@ -14196,7 +14199,7 @@
         </p:spPr>
         <p:txBody>
           <a:bodyPr vert="horz" lIns="91440" tIns="45720" rIns="91440" bIns="45720" rtlCol="0" anchor="ctr">
-            <a:normAutofit/>
+            <a:normAutofit fontScale="92500"/>
           </a:bodyPr>
           <a:lstStyle>
             <a:lvl1pPr algn="ctr" defTabSz="914400" rtl="0" eaLnBrk="1" latinLnBrk="0" hangingPunct="1">
@@ -14230,7 +14233,7 @@
                 </a:solidFill>
                 <a:latin typeface="Garamond" panose="02020404030301010803" pitchFamily="18" charset="0"/>
               </a:rPr>
-              <a:t>Open questions from last week 1</a:t>
+              <a:t>Open questions from last week (2023) 1</a:t>
             </a:r>
           </a:p>
         </p:txBody>
@@ -19465,7 +19468,7 @@
               </a:spcAft>
             </a:pPr>
             <a:r>
-              <a:rPr lang="en-US" sz="3600" b="1" dirty="0">
+              <a:rPr lang="en-US" b="1" dirty="0">
                 <a:solidFill>
                   <a:schemeClr val="tx1">
                     <a:lumMod val="65000"/>
@@ -19474,7 +19477,7 @@
                 </a:solidFill>
                 <a:latin typeface="Garamond" panose="02020404030301010803" pitchFamily="18" charset="0"/>
               </a:rPr>
-              <a:t>Game time!</a:t>
+              <a:t>Information in bioinformatics</a:t>
             </a:r>
           </a:p>
         </p:txBody>
@@ -19523,10 +19526,10 @@
       </p:sp>
       <p:sp>
         <p:nvSpPr>
-          <p:cNvPr id="12" name="TextBox 11">
+          <p:cNvPr id="21" name="TextBox 20">
             <a:extLst>
               <a:ext uri="{FF2B5EF4-FFF2-40B4-BE49-F238E27FC236}">
-                <a16:creationId xmlns:a16="http://schemas.microsoft.com/office/drawing/2014/main" id="{931F3E11-7241-F347-AB33-31328AFAF7D0}"/>
+                <a16:creationId xmlns:a16="http://schemas.microsoft.com/office/drawing/2014/main" id="{719ECCFE-5005-344D-BA7B-9CC92AD6F5A6}"/>
               </a:ext>
             </a:extLst>
           </p:cNvPr>
@@ -19535,8 +19538,8 @@
         </p:nvSpPr>
         <p:spPr>
           <a:xfrm>
-            <a:off x="112887" y="6538912"/>
-            <a:ext cx="7981245" cy="270796"/>
+            <a:off x="0" y="6538912"/>
+            <a:ext cx="5599191" cy="319088"/>
           </a:xfrm>
           <a:prstGeom prst="rect">
             <a:avLst/>
@@ -19584,7 +19587,7 @@
                 <a:ea typeface="Helvetica Neue" panose="02000503000000020004" pitchFamily="2" charset="0"/>
                 <a:cs typeface="Helvetica Neue" panose="02000503000000020004" pitchFamily="2" charset="0"/>
               </a:rPr>
-              <a:t>www.sciencenews.org</a:t>
+              <a:t>gensoft.pasteur.fr</a:t>
             </a:r>
             <a:r>
               <a:rPr lang="en-US" sz="800" dirty="0">
@@ -19595,7 +19598,7 @@
                 <a:ea typeface="Helvetica Neue" panose="02000503000000020004" pitchFamily="2" charset="0"/>
                 <a:cs typeface="Helvetica Neue" panose="02000503000000020004" pitchFamily="2" charset="0"/>
               </a:rPr>
-              <a:t>/wp-content/uploads/2018/05/050718_EC_numbers_feat.jpg, https://</a:t>
+              <a:t>/docs/meme/5.1.1/</a:t>
             </a:r>
             <a:r>
               <a:rPr lang="en-US" sz="800" dirty="0" err="1">
@@ -19606,7 +19609,7 @@
                 <a:ea typeface="Helvetica Neue" panose="02000503000000020004" pitchFamily="2" charset="0"/>
                 <a:cs typeface="Helvetica Neue" panose="02000503000000020004" pitchFamily="2" charset="0"/>
               </a:rPr>
-              <a:t>images.unsplash.com</a:t>
+              <a:t>meme.html</a:t>
             </a:r>
             <a:r>
               <a:rPr lang="en-US" sz="800" dirty="0">
@@ -19617,122 +19620,39 @@
                 <a:ea typeface="Helvetica Neue" panose="02000503000000020004" pitchFamily="2" charset="0"/>
                 <a:cs typeface="Helvetica Neue" panose="02000503000000020004" pitchFamily="2" charset="0"/>
               </a:rPr>
-              <a:t>/photo-1541278107931-e006523892df?ixlib=rb-1.2.1&amp;ixid=MnwxMjA3fDB8MHxzZWFyY2h8MXx8Y2FyZHN8ZW58MHx8MHx8&amp;w=1000&amp;q=80</a:t>
-            </a:r>
-          </a:p>
-        </p:txBody>
-      </p:sp>
-      <p:sp>
-        <p:nvSpPr>
-          <p:cNvPr id="13" name="TextBox 12">
-            <a:extLst>
-              <a:ext uri="{FF2B5EF4-FFF2-40B4-BE49-F238E27FC236}">
-                <a16:creationId xmlns:a16="http://schemas.microsoft.com/office/drawing/2014/main" id="{FC7A2621-6545-7C4B-BB34-7E4C4B886EEE}"/>
-              </a:ext>
-            </a:extLst>
-          </p:cNvPr>
-          <p:cNvSpPr txBox="1"/>
-          <p:nvPr/>
-        </p:nvSpPr>
-        <p:spPr>
-          <a:xfrm>
-            <a:off x="304800" y="4328611"/>
-            <a:ext cx="8534400" cy="1939506"/>
-          </a:xfrm>
-          <a:prstGeom prst="rect">
-            <a:avLst/>
-          </a:prstGeom>
-          <a:noFill/>
-          <a:ln w="12700">
-            <a:noFill/>
-          </a:ln>
-        </p:spPr>
-        <p:txBody>
-          <a:bodyPr vert="horz" wrap="square" lIns="91440" tIns="45720" rIns="91440" bIns="45720" rtlCol="0">
-            <a:noAutofit/>
-          </a:bodyPr>
-          <a:lstStyle/>
-          <a:p>
-            <a:pPr marL="342900" indent="-342900" fontAlgn="auto">
-              <a:spcBef>
-                <a:spcPts val="0"/>
-              </a:spcBef>
-              <a:spcAft>
-                <a:spcPts val="0"/>
-              </a:spcAft>
-              <a:buClr>
-                <a:schemeClr val="bg1">
-                  <a:lumMod val="50000"/>
-                </a:schemeClr>
-              </a:buClr>
-              <a:buSzPct val="100000"/>
-              <a:buFont typeface="Arial" panose="020B0604020202020204" pitchFamily="34" charset="0"/>
-              <a:buChar char="•"/>
-            </a:pPr>
-            <a:r>
-              <a:rPr lang="en-US" sz="2800" dirty="0">
-                <a:latin typeface="Helvetica Neue" panose="02000503000000020004" pitchFamily="2" charset="0"/>
-                <a:ea typeface="Helvetica Neue" panose="02000503000000020004" pitchFamily="2" charset="0"/>
-                <a:cs typeface="Helvetica Neue" panose="02000503000000020004" pitchFamily="2" charset="0"/>
-              </a:rPr>
-              <a:t>Two teams</a:t>
-            </a:r>
-          </a:p>
-          <a:p>
-            <a:pPr fontAlgn="auto">
-              <a:spcBef>
-                <a:spcPts val="0"/>
-              </a:spcBef>
-              <a:spcAft>
-                <a:spcPts val="0"/>
-              </a:spcAft>
-              <a:buClr>
-                <a:schemeClr val="bg1">
-                  <a:lumMod val="50000"/>
-                </a:schemeClr>
-              </a:buClr>
-              <a:buSzPct val="100000"/>
-            </a:pPr>
-            <a:endParaRPr lang="en-US" sz="2800" dirty="0">
-              <a:latin typeface="Helvetica Neue" panose="02000503000000020004" pitchFamily="2" charset="0"/>
-              <a:ea typeface="Helvetica Neue" panose="02000503000000020004" pitchFamily="2" charset="0"/>
-              <a:cs typeface="Helvetica Neue" panose="02000503000000020004" pitchFamily="2" charset="0"/>
-            </a:endParaRPr>
-          </a:p>
-          <a:p>
-            <a:pPr marL="342900" indent="-342900" fontAlgn="auto">
-              <a:spcBef>
-                <a:spcPts val="0"/>
-              </a:spcBef>
-              <a:spcAft>
-                <a:spcPts val="0"/>
-              </a:spcAft>
-              <a:buClr>
-                <a:schemeClr val="bg1">
-                  <a:lumMod val="50000"/>
-                </a:schemeClr>
-              </a:buClr>
-              <a:buSzPct val="100000"/>
-              <a:buFont typeface="Arial" panose="020B0604020202020204" pitchFamily="34" charset="0"/>
-              <a:buChar char="•"/>
-            </a:pPr>
-            <a:r>
-              <a:rPr lang="en-US" sz="2800" dirty="0">
-                <a:latin typeface="Helvetica Neue" panose="02000503000000020004" pitchFamily="2" charset="0"/>
-                <a:ea typeface="Helvetica Neue" panose="02000503000000020004" pitchFamily="2" charset="0"/>
-                <a:cs typeface="Helvetica Neue" panose="02000503000000020004" pitchFamily="2" charset="0"/>
-              </a:rPr>
-              <a:t>Phones/computers away</a:t>
+              <a:t>, https://</a:t>
+            </a:r>
+            <a:r>
+              <a:rPr lang="en-US" sz="800" dirty="0" err="1">
+                <a:solidFill>
+                  <a:prstClr val="black"/>
+                </a:solidFill>
+                <a:latin typeface="Helvetica Neue" panose="02000503000000020004" pitchFamily="2" charset="0"/>
+                <a:ea typeface="Helvetica Neue" panose="02000503000000020004" pitchFamily="2" charset="0"/>
+                <a:cs typeface="Helvetica Neue" panose="02000503000000020004" pitchFamily="2" charset="0"/>
+              </a:rPr>
+              <a:t>bmcbioinformatics.biomedcentral.com</a:t>
+            </a:r>
+            <a:r>
+              <a:rPr lang="en-US" sz="800" dirty="0">
+                <a:solidFill>
+                  <a:prstClr val="black"/>
+                </a:solidFill>
+                <a:latin typeface="Helvetica Neue" panose="02000503000000020004" pitchFamily="2" charset="0"/>
+                <a:ea typeface="Helvetica Neue" panose="02000503000000020004" pitchFamily="2" charset="0"/>
+                <a:cs typeface="Helvetica Neue" panose="02000503000000020004" pitchFamily="2" charset="0"/>
+              </a:rPr>
+              <a:t>/articles/10.1186/s12859-018-2378-9/figures/10</a:t>
             </a:r>
           </a:p>
         </p:txBody>
       </p:sp>
       <p:pic>
         <p:nvPicPr>
-          <p:cNvPr id="19458" name="Picture 2" descr="Real numbers don't cut it in the real world, this physicist argues |  Science News">
+          <p:cNvPr id="1026" name="Picture 2" descr="MEME - MEME Suite">
             <a:extLst>
               <a:ext uri="{FF2B5EF4-FFF2-40B4-BE49-F238E27FC236}">
-                <a16:creationId xmlns:a16="http://schemas.microsoft.com/office/drawing/2014/main" id="{F830BFA6-188A-6F43-9F8A-27F0230B2119}"/>
+                <a16:creationId xmlns:a16="http://schemas.microsoft.com/office/drawing/2014/main" id="{65D03DDF-D8A8-A0BF-AC0D-5FAE18AF741A}"/>
               </a:ext>
             </a:extLst>
           </p:cNvPr>
@@ -19756,8 +19676,8 @@
         </p:blipFill>
         <p:spPr bwMode="auto">
           <a:xfrm>
-            <a:off x="673100" y="1703810"/>
-            <a:ext cx="3898900" cy="2082800"/>
+            <a:off x="-27551" y="1103243"/>
+            <a:ext cx="6068445" cy="2270399"/>
           </a:xfrm>
           <a:prstGeom prst="rect">
             <a:avLst/>
@@ -19776,10 +19696,10 @@
       </p:pic>
       <p:pic>
         <p:nvPicPr>
-          <p:cNvPr id="19460" name="Picture 4" descr="Best 500+ Cards Pictures | Download Free Images on Unsplash">
+          <p:cNvPr id="1028" name="Picture 4" descr="Fig. 10">
             <a:extLst>
               <a:ext uri="{FF2B5EF4-FFF2-40B4-BE49-F238E27FC236}">
-                <a16:creationId xmlns:a16="http://schemas.microsoft.com/office/drawing/2014/main" id="{3F8FE3AC-A499-7446-A911-FDB31DF70C3B}"/>
+                <a16:creationId xmlns:a16="http://schemas.microsoft.com/office/drawing/2014/main" id="{B7845BCE-253E-5046-91A9-C6A74B51BA7A}"/>
               </a:ext>
             </a:extLst>
           </p:cNvPr>
@@ -19788,7 +19708,7 @@
           </p:cNvPicPr>
           <p:nvPr/>
         </p:nvPicPr>
-        <p:blipFill rotWithShape="1">
+        <p:blipFill>
           <a:blip r:embed="rId3">
             <a:extLst>
               <a:ext uri="{28A0092B-C50C-407E-A947-70E740481C1C}">
@@ -19796,13 +19716,15 @@
               </a:ext>
             </a:extLst>
           </a:blip>
-          <a:srcRect b="19145"/>
-          <a:stretch/>
+          <a:srcRect/>
+          <a:stretch>
+            <a:fillRect/>
+          </a:stretch>
         </p:blipFill>
         <p:spPr bwMode="auto">
           <a:xfrm>
-            <a:off x="4787901" y="1683875"/>
-            <a:ext cx="3898899" cy="2102735"/>
+            <a:off x="3710152" y="3888006"/>
+            <a:ext cx="4233967" cy="2468344"/>
           </a:xfrm>
           <a:prstGeom prst="rect">
             <a:avLst/>
@@ -19819,16 +19741,509 @@
           </a:extLst>
         </p:spPr>
       </p:pic>
+      <p:sp>
+        <p:nvSpPr>
+          <p:cNvPr id="6" name="TextBox 5">
+            <a:extLst>
+              <a:ext uri="{FF2B5EF4-FFF2-40B4-BE49-F238E27FC236}">
+                <a16:creationId xmlns:a16="http://schemas.microsoft.com/office/drawing/2014/main" id="{2A41A605-DA05-1387-56F6-BCEF366A3F26}"/>
+              </a:ext>
+            </a:extLst>
+          </p:cNvPr>
+          <p:cNvSpPr txBox="1"/>
+          <p:nvPr/>
+        </p:nvSpPr>
+        <p:spPr>
+          <a:xfrm>
+            <a:off x="6099050" y="1230291"/>
+            <a:ext cx="2986794" cy="2016302"/>
+          </a:xfrm>
+          <a:prstGeom prst="rect">
+            <a:avLst/>
+          </a:prstGeom>
+          <a:noFill/>
+          <a:ln w="12700">
+            <a:noFill/>
+          </a:ln>
+        </p:spPr>
+        <p:txBody>
+          <a:bodyPr vert="horz" wrap="square" lIns="91440" tIns="45720" rIns="91440" bIns="45720" rtlCol="0">
+            <a:noAutofit/>
+          </a:bodyPr>
+          <a:lstStyle/>
+          <a:p>
+            <a:pPr fontAlgn="auto">
+              <a:spcBef>
+                <a:spcPts val="0"/>
+              </a:spcBef>
+              <a:spcAft>
+                <a:spcPts val="0"/>
+              </a:spcAft>
+              <a:buClr>
+                <a:schemeClr val="bg1">
+                  <a:lumMod val="50000"/>
+                </a:schemeClr>
+              </a:buClr>
+              <a:buSzPct val="100000"/>
+            </a:pPr>
+            <a:r>
+              <a:rPr lang="en-US" sz="2400" dirty="0">
+                <a:latin typeface="Helvetica Neue" panose="02000503000000020004" pitchFamily="2" charset="0"/>
+                <a:ea typeface="Helvetica Neue" panose="02000503000000020004" pitchFamily="2" charset="0"/>
+                <a:cs typeface="Helvetica Neue" panose="02000503000000020004" pitchFamily="2" charset="0"/>
+              </a:rPr>
+              <a:t>Base = [A,T,C,G]</a:t>
+            </a:r>
+          </a:p>
+          <a:p>
+            <a:pPr fontAlgn="auto">
+              <a:spcBef>
+                <a:spcPts val="0"/>
+              </a:spcBef>
+              <a:spcAft>
+                <a:spcPts val="0"/>
+              </a:spcAft>
+              <a:buClr>
+                <a:schemeClr val="bg1">
+                  <a:lumMod val="50000"/>
+                </a:schemeClr>
+              </a:buClr>
+              <a:buSzPct val="100000"/>
+            </a:pPr>
+            <a:endParaRPr lang="en-US" sz="2400" dirty="0">
+              <a:latin typeface="Helvetica Neue" panose="02000503000000020004" pitchFamily="2" charset="0"/>
+              <a:ea typeface="Helvetica Neue" panose="02000503000000020004" pitchFamily="2" charset="0"/>
+              <a:cs typeface="Helvetica Neue" panose="02000503000000020004" pitchFamily="2" charset="0"/>
+            </a:endParaRPr>
+          </a:p>
+          <a:p>
+            <a:pPr fontAlgn="auto">
+              <a:spcBef>
+                <a:spcPts val="0"/>
+              </a:spcBef>
+              <a:spcAft>
+                <a:spcPts val="0"/>
+              </a:spcAft>
+              <a:buClr>
+                <a:schemeClr val="bg1">
+                  <a:lumMod val="50000"/>
+                </a:schemeClr>
+              </a:buClr>
+              <a:buSzPct val="100000"/>
+            </a:pPr>
+            <a:r>
+              <a:rPr lang="en-US" sz="2400" dirty="0">
+                <a:latin typeface="Helvetica Neue" panose="02000503000000020004" pitchFamily="2" charset="0"/>
+                <a:ea typeface="Helvetica Neue" panose="02000503000000020004" pitchFamily="2" charset="0"/>
+                <a:cs typeface="Helvetica Neue" panose="02000503000000020004" pitchFamily="2" charset="0"/>
+              </a:rPr>
+              <a:t>4 = 2</a:t>
+            </a:r>
+            <a:r>
+              <a:rPr lang="en-US" sz="2400" baseline="30000" dirty="0">
+                <a:latin typeface="Helvetica Neue" panose="02000503000000020004" pitchFamily="2" charset="0"/>
+                <a:ea typeface="Helvetica Neue" panose="02000503000000020004" pitchFamily="2" charset="0"/>
+                <a:cs typeface="Helvetica Neue" panose="02000503000000020004" pitchFamily="2" charset="0"/>
+              </a:rPr>
+              <a:t>2</a:t>
+            </a:r>
+            <a:r>
+              <a:rPr lang="en-US" sz="2400" dirty="0">
+                <a:latin typeface="Helvetica Neue" panose="02000503000000020004" pitchFamily="2" charset="0"/>
+                <a:ea typeface="Helvetica Neue" panose="02000503000000020004" pitchFamily="2" charset="0"/>
+                <a:cs typeface="Helvetica Neue" panose="02000503000000020004" pitchFamily="2" charset="0"/>
+              </a:rPr>
+              <a:t> possibilities</a:t>
+            </a:r>
+          </a:p>
+          <a:p>
+            <a:pPr fontAlgn="auto">
+              <a:spcBef>
+                <a:spcPts val="0"/>
+              </a:spcBef>
+              <a:spcAft>
+                <a:spcPts val="0"/>
+              </a:spcAft>
+              <a:buClr>
+                <a:schemeClr val="bg1">
+                  <a:lumMod val="50000"/>
+                </a:schemeClr>
+              </a:buClr>
+              <a:buSzPct val="100000"/>
+            </a:pPr>
+            <a:endParaRPr lang="en-US" sz="2400" dirty="0">
+              <a:latin typeface="Helvetica Neue" panose="02000503000000020004" pitchFamily="2" charset="0"/>
+              <a:ea typeface="Helvetica Neue" panose="02000503000000020004" pitchFamily="2" charset="0"/>
+              <a:cs typeface="Helvetica Neue" panose="02000503000000020004" pitchFamily="2" charset="0"/>
+            </a:endParaRPr>
+          </a:p>
+          <a:p>
+            <a:pPr fontAlgn="auto">
+              <a:spcBef>
+                <a:spcPts val="0"/>
+              </a:spcBef>
+              <a:spcAft>
+                <a:spcPts val="0"/>
+              </a:spcAft>
+              <a:buClr>
+                <a:schemeClr val="bg1">
+                  <a:lumMod val="50000"/>
+                </a:schemeClr>
+              </a:buClr>
+              <a:buSzPct val="100000"/>
+            </a:pPr>
+            <a:r>
+              <a:rPr lang="en-US" sz="2400" dirty="0">
+                <a:latin typeface="Helvetica Neue" panose="02000503000000020004" pitchFamily="2" charset="0"/>
+                <a:ea typeface="Helvetica Neue" panose="02000503000000020004" pitchFamily="2" charset="0"/>
+                <a:cs typeface="Helvetica Neue" panose="02000503000000020004" pitchFamily="2" charset="0"/>
+              </a:rPr>
+              <a:t>2 bits of information</a:t>
+            </a:r>
+          </a:p>
+        </p:txBody>
+      </p:sp>
+      <p:sp>
+        <p:nvSpPr>
+          <p:cNvPr id="18" name="TextBox 17">
+            <a:extLst>
+              <a:ext uri="{FF2B5EF4-FFF2-40B4-BE49-F238E27FC236}">
+                <a16:creationId xmlns:a16="http://schemas.microsoft.com/office/drawing/2014/main" id="{7E2F4EAD-84B5-26B6-9FBA-44663EEE75B6}"/>
+              </a:ext>
+            </a:extLst>
+          </p:cNvPr>
+          <p:cNvSpPr txBox="1"/>
+          <p:nvPr/>
+        </p:nvSpPr>
+        <p:spPr>
+          <a:xfrm>
+            <a:off x="211315" y="3948126"/>
+            <a:ext cx="3498837" cy="2016302"/>
+          </a:xfrm>
+          <a:prstGeom prst="rect">
+            <a:avLst/>
+          </a:prstGeom>
+          <a:noFill/>
+          <a:ln w="12700">
+            <a:noFill/>
+          </a:ln>
+        </p:spPr>
+        <p:txBody>
+          <a:bodyPr vert="horz" wrap="square" lIns="91440" tIns="45720" rIns="91440" bIns="45720" rtlCol="0">
+            <a:noAutofit/>
+          </a:bodyPr>
+          <a:lstStyle/>
+          <a:p>
+            <a:pPr fontAlgn="auto">
+              <a:spcBef>
+                <a:spcPts val="0"/>
+              </a:spcBef>
+              <a:spcAft>
+                <a:spcPts val="0"/>
+              </a:spcAft>
+              <a:buClr>
+                <a:schemeClr val="bg1">
+                  <a:lumMod val="50000"/>
+                </a:schemeClr>
+              </a:buClr>
+              <a:buSzPct val="100000"/>
+            </a:pPr>
+            <a:r>
+              <a:rPr lang="en-US" sz="2400" dirty="0">
+                <a:latin typeface="Helvetica Neue" panose="02000503000000020004" pitchFamily="2" charset="0"/>
+                <a:ea typeface="Helvetica Neue" panose="02000503000000020004" pitchFamily="2" charset="0"/>
+                <a:cs typeface="Helvetica Neue" panose="02000503000000020004" pitchFamily="2" charset="0"/>
+              </a:rPr>
+              <a:t>Residue = [A,C,..,Y]</a:t>
+            </a:r>
+          </a:p>
+          <a:p>
+            <a:pPr fontAlgn="auto">
+              <a:spcBef>
+                <a:spcPts val="0"/>
+              </a:spcBef>
+              <a:spcAft>
+                <a:spcPts val="0"/>
+              </a:spcAft>
+              <a:buClr>
+                <a:schemeClr val="bg1">
+                  <a:lumMod val="50000"/>
+                </a:schemeClr>
+              </a:buClr>
+              <a:buSzPct val="100000"/>
+            </a:pPr>
+            <a:endParaRPr lang="en-US" sz="2400" dirty="0">
+              <a:latin typeface="Helvetica Neue" panose="02000503000000020004" pitchFamily="2" charset="0"/>
+              <a:ea typeface="Helvetica Neue" panose="02000503000000020004" pitchFamily="2" charset="0"/>
+              <a:cs typeface="Helvetica Neue" panose="02000503000000020004" pitchFamily="2" charset="0"/>
+            </a:endParaRPr>
+          </a:p>
+          <a:p>
+            <a:pPr fontAlgn="auto">
+              <a:spcBef>
+                <a:spcPts val="0"/>
+              </a:spcBef>
+              <a:spcAft>
+                <a:spcPts val="0"/>
+              </a:spcAft>
+              <a:buClr>
+                <a:schemeClr val="bg1">
+                  <a:lumMod val="50000"/>
+                </a:schemeClr>
+              </a:buClr>
+              <a:buSzPct val="100000"/>
+            </a:pPr>
+            <a:r>
+              <a:rPr lang="en-US" sz="2400" dirty="0">
+                <a:latin typeface="Helvetica Neue" panose="02000503000000020004" pitchFamily="2" charset="0"/>
+                <a:ea typeface="Helvetica Neue" panose="02000503000000020004" pitchFamily="2" charset="0"/>
+                <a:cs typeface="Helvetica Neue" panose="02000503000000020004" pitchFamily="2" charset="0"/>
+              </a:rPr>
+              <a:t>20 = 2</a:t>
+            </a:r>
+            <a:r>
+              <a:rPr lang="en-US" sz="2400" baseline="30000" dirty="0">
+                <a:latin typeface="Helvetica Neue" panose="02000503000000020004" pitchFamily="2" charset="0"/>
+                <a:ea typeface="Helvetica Neue" panose="02000503000000020004" pitchFamily="2" charset="0"/>
+                <a:cs typeface="Helvetica Neue" panose="02000503000000020004" pitchFamily="2" charset="0"/>
+              </a:rPr>
+              <a:t>4.32</a:t>
+            </a:r>
+            <a:r>
+              <a:rPr lang="en-US" sz="2400" dirty="0">
+                <a:latin typeface="Helvetica Neue" panose="02000503000000020004" pitchFamily="2" charset="0"/>
+                <a:ea typeface="Helvetica Neue" panose="02000503000000020004" pitchFamily="2" charset="0"/>
+                <a:cs typeface="Helvetica Neue" panose="02000503000000020004" pitchFamily="2" charset="0"/>
+              </a:rPr>
+              <a:t> possibilities</a:t>
+            </a:r>
+          </a:p>
+          <a:p>
+            <a:pPr fontAlgn="auto">
+              <a:spcBef>
+                <a:spcPts val="0"/>
+              </a:spcBef>
+              <a:spcAft>
+                <a:spcPts val="0"/>
+              </a:spcAft>
+              <a:buClr>
+                <a:schemeClr val="bg1">
+                  <a:lumMod val="50000"/>
+                </a:schemeClr>
+              </a:buClr>
+              <a:buSzPct val="100000"/>
+            </a:pPr>
+            <a:endParaRPr lang="en-US" sz="2400" dirty="0">
+              <a:latin typeface="Helvetica Neue" panose="02000503000000020004" pitchFamily="2" charset="0"/>
+              <a:ea typeface="Helvetica Neue" panose="02000503000000020004" pitchFamily="2" charset="0"/>
+              <a:cs typeface="Helvetica Neue" panose="02000503000000020004" pitchFamily="2" charset="0"/>
+            </a:endParaRPr>
+          </a:p>
+          <a:p>
+            <a:pPr fontAlgn="auto">
+              <a:spcBef>
+                <a:spcPts val="0"/>
+              </a:spcBef>
+              <a:spcAft>
+                <a:spcPts val="0"/>
+              </a:spcAft>
+              <a:buClr>
+                <a:schemeClr val="bg1">
+                  <a:lumMod val="50000"/>
+                </a:schemeClr>
+              </a:buClr>
+              <a:buSzPct val="100000"/>
+            </a:pPr>
+            <a:r>
+              <a:rPr lang="en-US" sz="2400" dirty="0">
+                <a:latin typeface="Helvetica Neue" panose="02000503000000020004" pitchFamily="2" charset="0"/>
+                <a:ea typeface="Helvetica Neue" panose="02000503000000020004" pitchFamily="2" charset="0"/>
+                <a:cs typeface="Helvetica Neue" panose="02000503000000020004" pitchFamily="2" charset="0"/>
+              </a:rPr>
+              <a:t>4.32 bits of information</a:t>
+            </a:r>
+          </a:p>
+        </p:txBody>
+      </p:sp>
     </p:spTree>
     <p:extLst>
       <p:ext uri="{BB962C8B-B14F-4D97-AF65-F5344CB8AC3E}">
-        <p14:creationId xmlns:p14="http://schemas.microsoft.com/office/powerpoint/2010/main" val="3016208406"/>
+        <p14:creationId xmlns:p14="http://schemas.microsoft.com/office/powerpoint/2010/main" val="1078780320"/>
       </p:ext>
     </p:extLst>
   </p:cSld>
   <p:clrMapOvr>
     <a:masterClrMapping/>
   </p:clrMapOvr>
+  <p:timing>
+    <p:tnLst>
+      <p:par>
+        <p:cTn id="1" dur="indefinite" restart="never" nodeType="tmRoot">
+          <p:childTnLst>
+            <p:seq concurrent="1" nextAc="seek">
+              <p:cTn id="2" dur="indefinite" nodeType="mainSeq">
+                <p:childTnLst>
+                  <p:par>
+                    <p:cTn id="3" fill="hold">
+                      <p:stCondLst>
+                        <p:cond delay="indefinite"/>
+                      </p:stCondLst>
+                      <p:childTnLst>
+                        <p:par>
+                          <p:cTn id="4" fill="hold">
+                            <p:stCondLst>
+                              <p:cond delay="0"/>
+                            </p:stCondLst>
+                            <p:childTnLst>
+                              <p:par>
+                                <p:cTn id="5" presetID="1" presetClass="entr" presetSubtype="0" fill="hold" grpId="0" nodeType="clickEffect">
+                                  <p:stCondLst>
+                                    <p:cond delay="0"/>
+                                  </p:stCondLst>
+                                  <p:childTnLst>
+                                    <p:set>
+                                      <p:cBhvr>
+                                        <p:cTn id="6" dur="1" fill="hold">
+                                          <p:stCondLst>
+                                            <p:cond delay="0"/>
+                                          </p:stCondLst>
+                                        </p:cTn>
+                                        <p:tgtEl>
+                                          <p:spTgt spid="6"/>
+                                        </p:tgtEl>
+                                        <p:attrNameLst>
+                                          <p:attrName>style.visibility</p:attrName>
+                                        </p:attrNameLst>
+                                      </p:cBhvr>
+                                      <p:to>
+                                        <p:strVal val="visible"/>
+                                      </p:to>
+                                    </p:set>
+                                  </p:childTnLst>
+                                </p:cTn>
+                              </p:par>
+                            </p:childTnLst>
+                          </p:cTn>
+                        </p:par>
+                      </p:childTnLst>
+                    </p:cTn>
+                  </p:par>
+                  <p:par>
+                    <p:cTn id="7" fill="hold">
+                      <p:stCondLst>
+                        <p:cond delay="indefinite"/>
+                      </p:stCondLst>
+                      <p:childTnLst>
+                        <p:par>
+                          <p:cTn id="8" fill="hold">
+                            <p:stCondLst>
+                              <p:cond delay="0"/>
+                            </p:stCondLst>
+                            <p:childTnLst>
+                              <p:par>
+                                <p:cTn id="9" presetID="1" presetClass="entr" presetSubtype="0" fill="hold" nodeType="clickEffect">
+                                  <p:stCondLst>
+                                    <p:cond delay="0"/>
+                                  </p:stCondLst>
+                                  <p:childTnLst>
+                                    <p:set>
+                                      <p:cBhvr>
+                                        <p:cTn id="10" dur="1" fill="hold">
+                                          <p:stCondLst>
+                                            <p:cond delay="0"/>
+                                          </p:stCondLst>
+                                        </p:cTn>
+                                        <p:tgtEl>
+                                          <p:spTgt spid="1028"/>
+                                        </p:tgtEl>
+                                        <p:attrNameLst>
+                                          <p:attrName>style.visibility</p:attrName>
+                                        </p:attrNameLst>
+                                      </p:cBhvr>
+                                      <p:to>
+                                        <p:strVal val="visible"/>
+                                      </p:to>
+                                    </p:set>
+                                  </p:childTnLst>
+                                </p:cTn>
+                              </p:par>
+                            </p:childTnLst>
+                          </p:cTn>
+                        </p:par>
+                      </p:childTnLst>
+                    </p:cTn>
+                  </p:par>
+                  <p:par>
+                    <p:cTn id="11" fill="hold">
+                      <p:stCondLst>
+                        <p:cond delay="indefinite"/>
+                      </p:stCondLst>
+                      <p:childTnLst>
+                        <p:par>
+                          <p:cTn id="12" fill="hold">
+                            <p:stCondLst>
+                              <p:cond delay="0"/>
+                            </p:stCondLst>
+                            <p:childTnLst>
+                              <p:par>
+                                <p:cTn id="13" presetID="1" presetClass="entr" presetSubtype="0" fill="hold" grpId="0" nodeType="clickEffect">
+                                  <p:stCondLst>
+                                    <p:cond delay="0"/>
+                                  </p:stCondLst>
+                                  <p:childTnLst>
+                                    <p:set>
+                                      <p:cBhvr>
+                                        <p:cTn id="14" dur="1" fill="hold">
+                                          <p:stCondLst>
+                                            <p:cond delay="0"/>
+                                          </p:stCondLst>
+                                        </p:cTn>
+                                        <p:tgtEl>
+                                          <p:spTgt spid="18"/>
+                                        </p:tgtEl>
+                                        <p:attrNameLst>
+                                          <p:attrName>style.visibility</p:attrName>
+                                        </p:attrNameLst>
+                                      </p:cBhvr>
+                                      <p:to>
+                                        <p:strVal val="visible"/>
+                                      </p:to>
+                                    </p:set>
+                                  </p:childTnLst>
+                                </p:cTn>
+                              </p:par>
+                            </p:childTnLst>
+                          </p:cTn>
+                        </p:par>
+                      </p:childTnLst>
+                    </p:cTn>
+                  </p:par>
+                </p:childTnLst>
+              </p:cTn>
+              <p:prevCondLst>
+                <p:cond evt="onPrev" delay="0">
+                  <p:tgtEl>
+                    <p:sldTgt/>
+                  </p:tgtEl>
+                </p:cond>
+              </p:prevCondLst>
+              <p:nextCondLst>
+                <p:cond evt="onNext" delay="0">
+                  <p:tgtEl>
+                    <p:sldTgt/>
+                  </p:tgtEl>
+                </p:cond>
+              </p:nextCondLst>
+            </p:seq>
+          </p:childTnLst>
+        </p:cTn>
+      </p:par>
+    </p:tnLst>
+    <p:bldLst>
+      <p:bldP spid="6" grpId="0"/>
+      <p:bldP spid="18" grpId="0"/>
+    </p:bldLst>
+  </p:timing>
 </p:sld>
 </file>
 
@@ -19893,7 +20308,7 @@
               </a:spcAft>
             </a:pPr>
             <a:r>
-              <a:rPr lang="en-US" sz="3600" b="1" dirty="0">
+              <a:rPr lang="en-US" b="1" dirty="0">
                 <a:solidFill>
                   <a:schemeClr val="tx1">
                     <a:lumMod val="65000"/>
@@ -19902,7 +20317,7 @@
                 </a:solidFill>
                 <a:latin typeface="Garamond" panose="02020404030301010803" pitchFamily="18" charset="0"/>
               </a:rPr>
-              <a:t>Game 1: Guess that number!</a:t>
+              <a:t>Information in microscopy</a:t>
             </a:r>
           </a:p>
         </p:txBody>
@@ -19949,12 +20364,91 @@
           </a:p>
         </p:txBody>
       </p:sp>
+      <p:sp>
+        <p:nvSpPr>
+          <p:cNvPr id="21" name="TextBox 20">
+            <a:extLst>
+              <a:ext uri="{FF2B5EF4-FFF2-40B4-BE49-F238E27FC236}">
+                <a16:creationId xmlns:a16="http://schemas.microsoft.com/office/drawing/2014/main" id="{719ECCFE-5005-344D-BA7B-9CC92AD6F5A6}"/>
+              </a:ext>
+            </a:extLst>
+          </p:cNvPr>
+          <p:cNvSpPr txBox="1"/>
+          <p:nvPr/>
+        </p:nvSpPr>
+        <p:spPr>
+          <a:xfrm>
+            <a:off x="0" y="6538912"/>
+            <a:ext cx="5599191" cy="319088"/>
+          </a:xfrm>
+          <a:prstGeom prst="rect">
+            <a:avLst/>
+          </a:prstGeom>
+          <a:noFill/>
+          <a:ln w="12700">
+            <a:noFill/>
+          </a:ln>
+        </p:spPr>
+        <p:txBody>
+          <a:bodyPr vert="horz" wrap="square" lIns="91440" tIns="45720" rIns="91440" bIns="45720" rtlCol="0">
+            <a:noAutofit/>
+          </a:bodyPr>
+          <a:lstStyle/>
+          <a:p>
+            <a:pPr fontAlgn="auto">
+              <a:spcBef>
+                <a:spcPts val="0"/>
+              </a:spcBef>
+              <a:spcAft>
+                <a:spcPts val="600"/>
+              </a:spcAft>
+              <a:buClr>
+                <a:srgbClr val="0070C0"/>
+              </a:buClr>
+              <a:buSzPct val="100000"/>
+            </a:pPr>
+            <a:r>
+              <a:rPr lang="en-US" sz="800" dirty="0">
+                <a:solidFill>
+                  <a:prstClr val="black"/>
+                </a:solidFill>
+                <a:latin typeface="Helvetica Neue" panose="02000503000000020004" pitchFamily="2" charset="0"/>
+                <a:ea typeface="Helvetica Neue" panose="02000503000000020004" pitchFamily="2" charset="0"/>
+                <a:cs typeface="Helvetica Neue" panose="02000503000000020004" pitchFamily="2" charset="0"/>
+              </a:rPr>
+              <a:t>https://</a:t>
+            </a:r>
+            <a:r>
+              <a:rPr lang="en-US" sz="800" dirty="0" err="1">
+                <a:solidFill>
+                  <a:prstClr val="black"/>
+                </a:solidFill>
+                <a:latin typeface="Helvetica Neue" panose="02000503000000020004" pitchFamily="2" charset="0"/>
+                <a:ea typeface="Helvetica Neue" panose="02000503000000020004" pitchFamily="2" charset="0"/>
+                <a:cs typeface="Helvetica Neue" panose="02000503000000020004" pitchFamily="2" charset="0"/>
+              </a:rPr>
+              <a:t>www.photometrics.com</a:t>
+            </a:r>
+            <a:r>
+              <a:rPr lang="en-US" sz="800" dirty="0">
+                <a:solidFill>
+                  <a:prstClr val="black"/>
+                </a:solidFill>
+                <a:latin typeface="Helvetica Neue" panose="02000503000000020004" pitchFamily="2" charset="0"/>
+                <a:ea typeface="Helvetica Neue" panose="02000503000000020004" pitchFamily="2" charset="0"/>
+                <a:cs typeface="Helvetica Neue" panose="02000503000000020004" pitchFamily="2" charset="0"/>
+              </a:rPr>
+              <a:t>/learn/camera-basics/bit-depth</a:t>
+            </a:r>
+          </a:p>
+        </p:txBody>
+      </p:sp>
       <p:pic>
         <p:nvPicPr>
-          <p:cNvPr id="8" name="Picture 2" descr="Real numbers don't cut it in the real world, this physicist argues |  Science News">
+          <p:cNvPr id="2050" name="Picture 2">
             <a:extLst>
               <a:ext uri="{FF2B5EF4-FFF2-40B4-BE49-F238E27FC236}">
-                <a16:creationId xmlns:a16="http://schemas.microsoft.com/office/drawing/2014/main" id="{A037EEFC-220A-FC47-83D8-072E9AEF71B7}"/>
+                <a16:creationId xmlns:a16="http://schemas.microsoft.com/office/drawing/2014/main" id="{922C0918-0E7C-CF1C-3605-96B29C0B6109}"/>
               </a:ext>
             </a:extLst>
           </p:cNvPr>
@@ -19978,8 +20472,8 @@
         </p:blipFill>
         <p:spPr bwMode="auto">
           <a:xfrm>
-            <a:off x="2622550" y="1346200"/>
-            <a:ext cx="3898900" cy="2082800"/>
+            <a:off x="351517" y="1181414"/>
+            <a:ext cx="4319691" cy="4919870"/>
           </a:xfrm>
           <a:prstGeom prst="rect">
             <a:avLst/>
@@ -19998,171 +20492,1009 @@
       </p:pic>
       <p:sp>
         <p:nvSpPr>
-          <p:cNvPr id="9" name="TextBox 8">
+          <p:cNvPr id="9" name="Rectangle 8">
             <a:extLst>
               <a:ext uri="{FF2B5EF4-FFF2-40B4-BE49-F238E27FC236}">
-                <a16:creationId xmlns:a16="http://schemas.microsoft.com/office/drawing/2014/main" id="{3DE81A93-0D65-7042-97C9-B64E2BB1820C}"/>
+                <a16:creationId xmlns:a16="http://schemas.microsoft.com/office/drawing/2014/main" id="{5B87D7F3-DF4E-722E-3C0A-FCA247E85CC5}"/>
               </a:ext>
             </a:extLst>
           </p:cNvPr>
-          <p:cNvSpPr txBox="1"/>
+          <p:cNvSpPr/>
           <p:nvPr/>
         </p:nvSpPr>
         <p:spPr>
           <a:xfrm>
-            <a:off x="255181" y="4076376"/>
-            <a:ext cx="8686800" cy="2279974"/>
+            <a:off x="2511362" y="1181414"/>
+            <a:ext cx="2229606" cy="1621421"/>
           </a:xfrm>
           <a:prstGeom prst="rect">
             <a:avLst/>
           </a:prstGeom>
-          <a:noFill/>
-          <a:ln w="12700">
+          <a:solidFill>
+            <a:schemeClr val="bg1"/>
+          </a:solidFill>
+          <a:ln>
             <a:noFill/>
           </a:ln>
         </p:spPr>
+        <p:style>
+          <a:lnRef idx="2">
+            <a:schemeClr val="accent1">
+              <a:shade val="15000"/>
+            </a:schemeClr>
+          </a:lnRef>
+          <a:fillRef idx="1">
+            <a:schemeClr val="accent1"/>
+          </a:fillRef>
+          <a:effectRef idx="0">
+            <a:schemeClr val="accent1"/>
+          </a:effectRef>
+          <a:fontRef idx="minor">
+            <a:schemeClr val="lt1"/>
+          </a:fontRef>
+        </p:style>
         <p:txBody>
-          <a:bodyPr vert="horz" wrap="square" lIns="91440" tIns="45720" rIns="91440" bIns="45720" rtlCol="0">
-            <a:noAutofit/>
-          </a:bodyPr>
+          <a:bodyPr rtlCol="0" anchor="ctr"/>
           <a:lstStyle/>
           <a:p>
-            <a:pPr marL="457200" indent="-457200" fontAlgn="auto">
-              <a:spcBef>
-                <a:spcPts val="0"/>
-              </a:spcBef>
-              <a:spcAft>
-                <a:spcPts val="1200"/>
-              </a:spcAft>
-              <a:buClr>
-                <a:schemeClr val="bg1">
-                  <a:lumMod val="50000"/>
-                </a:schemeClr>
-              </a:buClr>
-              <a:buSzPct val="100000"/>
-              <a:buFont typeface="Arial" panose="020B0604020202020204" pitchFamily="34" charset="0"/>
-              <a:buChar char="•"/>
-            </a:pPr>
-            <a:r>
-              <a:rPr lang="en-US" sz="3200" i="1" dirty="0">
-                <a:latin typeface="Helvetica Neue" panose="02000503000000020004" pitchFamily="2" charset="0"/>
-                <a:ea typeface="Helvetica Neue" panose="02000503000000020004" pitchFamily="2" charset="0"/>
-                <a:cs typeface="Helvetica Neue" panose="02000503000000020004" pitchFamily="2" charset="0"/>
-              </a:rPr>
-              <a:t>N </a:t>
-            </a:r>
-            <a:r>
-              <a:rPr lang="en-US" sz="3200" dirty="0">
-                <a:latin typeface="Helvetica Neue" panose="02000503000000020004" pitchFamily="2" charset="0"/>
-                <a:ea typeface="Helvetica Neue" panose="02000503000000020004" pitchFamily="2" charset="0"/>
-                <a:cs typeface="Helvetica Neue" panose="02000503000000020004" pitchFamily="2" charset="0"/>
-              </a:rPr>
-              <a:t>= </a:t>
-            </a:r>
-            <a:r>
-              <a:rPr lang="en-US" sz="3200" dirty="0" err="1">
-                <a:latin typeface="Helvetica Neue" panose="02000503000000020004" pitchFamily="2" charset="0"/>
-                <a:ea typeface="Helvetica Neue" panose="02000503000000020004" pitchFamily="2" charset="0"/>
-                <a:cs typeface="Helvetica Neue" panose="02000503000000020004" pitchFamily="2" charset="0"/>
-              </a:rPr>
-              <a:t>randint</a:t>
-            </a:r>
-            <a:r>
-              <a:rPr lang="en-US" sz="3200" dirty="0">
-                <a:latin typeface="Helvetica Neue" panose="02000503000000020004" pitchFamily="2" charset="0"/>
-                <a:ea typeface="Helvetica Neue" panose="02000503000000020004" pitchFamily="2" charset="0"/>
-                <a:cs typeface="Helvetica Neue" panose="02000503000000020004" pitchFamily="2" charset="0"/>
-              </a:rPr>
-              <a:t>(1,100)</a:t>
-            </a:r>
-          </a:p>
-          <a:p>
-            <a:pPr marL="457200" indent="-457200" fontAlgn="auto">
-              <a:spcBef>
-                <a:spcPts val="0"/>
-              </a:spcBef>
-              <a:spcAft>
-                <a:spcPts val="1200"/>
-              </a:spcAft>
-              <a:buClr>
-                <a:schemeClr val="bg1">
-                  <a:lumMod val="50000"/>
-                </a:schemeClr>
-              </a:buClr>
-              <a:buSzPct val="100000"/>
-              <a:buFont typeface="Arial" panose="020B0604020202020204" pitchFamily="34" charset="0"/>
-              <a:buChar char="•"/>
-            </a:pPr>
-            <a:r>
-              <a:rPr lang="en-US" sz="3200" dirty="0">
-                <a:latin typeface="Helvetica Neue" panose="02000503000000020004" pitchFamily="2" charset="0"/>
-                <a:ea typeface="Helvetica Neue" panose="02000503000000020004" pitchFamily="2" charset="0"/>
-                <a:cs typeface="Helvetica Neue" panose="02000503000000020004" pitchFamily="2" charset="0"/>
-              </a:rPr>
-              <a:t>Your guess: a integer between 1–100</a:t>
-            </a:r>
-          </a:p>
-          <a:p>
-            <a:pPr marL="457200" indent="-457200" fontAlgn="auto">
-              <a:spcBef>
-                <a:spcPts val="0"/>
-              </a:spcBef>
-              <a:spcAft>
-                <a:spcPts val="1200"/>
-              </a:spcAft>
-              <a:buClr>
-                <a:schemeClr val="bg1">
-                  <a:lumMod val="50000"/>
-                </a:schemeClr>
-              </a:buClr>
-              <a:buSzPct val="100000"/>
-              <a:buFont typeface="Arial" panose="020B0604020202020204" pitchFamily="34" charset="0"/>
-              <a:buChar char="•"/>
-            </a:pPr>
-            <a:r>
-              <a:rPr lang="en-US" sz="3200" dirty="0">
-                <a:latin typeface="Helvetica Neue" panose="02000503000000020004" pitchFamily="2" charset="0"/>
-                <a:ea typeface="Helvetica Neue" panose="02000503000000020004" pitchFamily="2" charset="0"/>
-                <a:cs typeface="Helvetica Neue" panose="02000503000000020004" pitchFamily="2" charset="0"/>
-              </a:rPr>
-              <a:t>The reveal: “Match” OR “higher” OR “lower”</a:t>
-            </a:r>
-          </a:p>
-          <a:p>
-            <a:pPr marL="457200" indent="-457200" fontAlgn="auto">
-              <a:spcBef>
-                <a:spcPts val="0"/>
-              </a:spcBef>
-              <a:spcAft>
-                <a:spcPts val="1200"/>
-              </a:spcAft>
-              <a:buClr>
-                <a:schemeClr val="bg1">
-                  <a:lumMod val="50000"/>
-                </a:schemeClr>
-              </a:buClr>
-              <a:buSzPct val="100000"/>
-              <a:buFont typeface="Arial" panose="020B0604020202020204" pitchFamily="34" charset="0"/>
-              <a:buChar char="•"/>
-            </a:pPr>
-            <a:endParaRPr lang="en-US" sz="3200" dirty="0">
-              <a:latin typeface="Helvetica Neue" panose="02000503000000020004" pitchFamily="2" charset="0"/>
-              <a:ea typeface="Helvetica Neue" panose="02000503000000020004" pitchFamily="2" charset="0"/>
-              <a:cs typeface="Helvetica Neue" panose="02000503000000020004" pitchFamily="2" charset="0"/>
-            </a:endParaRPr>
+            <a:pPr algn="ctr"/>
+            <a:endParaRPr lang="en-US"/>
           </a:p>
         </p:txBody>
       </p:sp>
+      <p:sp>
+        <p:nvSpPr>
+          <p:cNvPr id="10" name="Rectangle 9">
+            <a:extLst>
+              <a:ext uri="{FF2B5EF4-FFF2-40B4-BE49-F238E27FC236}">
+                <a16:creationId xmlns:a16="http://schemas.microsoft.com/office/drawing/2014/main" id="{37EF0D83-FBAC-0B0B-C261-BF9C3E9F9D2D}"/>
+              </a:ext>
+            </a:extLst>
+          </p:cNvPr>
+          <p:cNvSpPr/>
+          <p:nvPr/>
+        </p:nvSpPr>
+        <p:spPr>
+          <a:xfrm>
+            <a:off x="265118" y="2811432"/>
+            <a:ext cx="2229606" cy="1621421"/>
+          </a:xfrm>
+          <a:prstGeom prst="rect">
+            <a:avLst/>
+          </a:prstGeom>
+          <a:solidFill>
+            <a:schemeClr val="bg1"/>
+          </a:solidFill>
+          <a:ln>
+            <a:noFill/>
+          </a:ln>
+        </p:spPr>
+        <p:style>
+          <a:lnRef idx="2">
+            <a:schemeClr val="accent1">
+              <a:shade val="15000"/>
+            </a:schemeClr>
+          </a:lnRef>
+          <a:fillRef idx="1">
+            <a:schemeClr val="accent1"/>
+          </a:fillRef>
+          <a:effectRef idx="0">
+            <a:schemeClr val="accent1"/>
+          </a:effectRef>
+          <a:fontRef idx="minor">
+            <a:schemeClr val="lt1"/>
+          </a:fontRef>
+        </p:style>
+        <p:txBody>
+          <a:bodyPr rtlCol="0" anchor="ctr"/>
+          <a:lstStyle/>
+          <a:p>
+            <a:pPr algn="ctr"/>
+            <a:endParaRPr lang="en-US"/>
+          </a:p>
+        </p:txBody>
+      </p:sp>
+      <p:sp>
+        <p:nvSpPr>
+          <p:cNvPr id="11" name="Rectangle 10">
+            <a:extLst>
+              <a:ext uri="{FF2B5EF4-FFF2-40B4-BE49-F238E27FC236}">
+                <a16:creationId xmlns:a16="http://schemas.microsoft.com/office/drawing/2014/main" id="{967E29F9-AF0B-49A1-5281-A90AB175DA28}"/>
+              </a:ext>
+            </a:extLst>
+          </p:cNvPr>
+          <p:cNvSpPr/>
+          <p:nvPr/>
+        </p:nvSpPr>
+        <p:spPr>
+          <a:xfrm>
+            <a:off x="2528001" y="2830638"/>
+            <a:ext cx="2229606" cy="1621421"/>
+          </a:xfrm>
+          <a:prstGeom prst="rect">
+            <a:avLst/>
+          </a:prstGeom>
+          <a:solidFill>
+            <a:schemeClr val="bg1"/>
+          </a:solidFill>
+          <a:ln>
+            <a:noFill/>
+          </a:ln>
+        </p:spPr>
+        <p:style>
+          <a:lnRef idx="2">
+            <a:schemeClr val="accent1">
+              <a:shade val="15000"/>
+            </a:schemeClr>
+          </a:lnRef>
+          <a:fillRef idx="1">
+            <a:schemeClr val="accent1"/>
+          </a:fillRef>
+          <a:effectRef idx="0">
+            <a:schemeClr val="accent1"/>
+          </a:effectRef>
+          <a:fontRef idx="minor">
+            <a:schemeClr val="lt1"/>
+          </a:fontRef>
+        </p:style>
+        <p:txBody>
+          <a:bodyPr rtlCol="0" anchor="ctr"/>
+          <a:lstStyle/>
+          <a:p>
+            <a:pPr algn="ctr"/>
+            <a:endParaRPr lang="en-US"/>
+          </a:p>
+        </p:txBody>
+      </p:sp>
+      <p:sp>
+        <p:nvSpPr>
+          <p:cNvPr id="12" name="Rectangle 11">
+            <a:extLst>
+              <a:ext uri="{FF2B5EF4-FFF2-40B4-BE49-F238E27FC236}">
+                <a16:creationId xmlns:a16="http://schemas.microsoft.com/office/drawing/2014/main" id="{7A82A6CD-8B92-47DA-5893-47A708BD5B27}"/>
+              </a:ext>
+            </a:extLst>
+          </p:cNvPr>
+          <p:cNvSpPr/>
+          <p:nvPr/>
+        </p:nvSpPr>
+        <p:spPr>
+          <a:xfrm>
+            <a:off x="261879" y="4480534"/>
+            <a:ext cx="2229606" cy="1621421"/>
+          </a:xfrm>
+          <a:prstGeom prst="rect">
+            <a:avLst/>
+          </a:prstGeom>
+          <a:solidFill>
+            <a:schemeClr val="bg1"/>
+          </a:solidFill>
+          <a:ln>
+            <a:noFill/>
+          </a:ln>
+        </p:spPr>
+        <p:style>
+          <a:lnRef idx="2">
+            <a:schemeClr val="accent1">
+              <a:shade val="15000"/>
+            </a:schemeClr>
+          </a:lnRef>
+          <a:fillRef idx="1">
+            <a:schemeClr val="accent1"/>
+          </a:fillRef>
+          <a:effectRef idx="0">
+            <a:schemeClr val="accent1"/>
+          </a:effectRef>
+          <a:fontRef idx="minor">
+            <a:schemeClr val="lt1"/>
+          </a:fontRef>
+        </p:style>
+        <p:txBody>
+          <a:bodyPr rtlCol="0" anchor="ctr"/>
+          <a:lstStyle/>
+          <a:p>
+            <a:pPr algn="ctr"/>
+            <a:endParaRPr lang="en-US"/>
+          </a:p>
+        </p:txBody>
+      </p:sp>
+      <p:sp>
+        <p:nvSpPr>
+          <p:cNvPr id="13" name="Rectangle 12">
+            <a:extLst>
+              <a:ext uri="{FF2B5EF4-FFF2-40B4-BE49-F238E27FC236}">
+                <a16:creationId xmlns:a16="http://schemas.microsoft.com/office/drawing/2014/main" id="{0164631C-2ADE-A419-9BF4-AA8C96C573CA}"/>
+              </a:ext>
+            </a:extLst>
+          </p:cNvPr>
+          <p:cNvSpPr/>
+          <p:nvPr/>
+        </p:nvSpPr>
+        <p:spPr>
+          <a:xfrm>
+            <a:off x="2496470" y="4468614"/>
+            <a:ext cx="2229606" cy="1621421"/>
+          </a:xfrm>
+          <a:prstGeom prst="rect">
+            <a:avLst/>
+          </a:prstGeom>
+          <a:solidFill>
+            <a:schemeClr val="bg1"/>
+          </a:solidFill>
+          <a:ln>
+            <a:noFill/>
+          </a:ln>
+        </p:spPr>
+        <p:style>
+          <a:lnRef idx="2">
+            <a:schemeClr val="accent1">
+              <a:shade val="15000"/>
+            </a:schemeClr>
+          </a:lnRef>
+          <a:fillRef idx="1">
+            <a:schemeClr val="accent1"/>
+          </a:fillRef>
+          <a:effectRef idx="0">
+            <a:schemeClr val="accent1"/>
+          </a:effectRef>
+          <a:fontRef idx="minor">
+            <a:schemeClr val="lt1"/>
+          </a:fontRef>
+        </p:style>
+        <p:txBody>
+          <a:bodyPr rtlCol="0" anchor="ctr"/>
+          <a:lstStyle/>
+          <a:p>
+            <a:pPr algn="ctr"/>
+            <a:endParaRPr lang="en-US"/>
+          </a:p>
+        </p:txBody>
+      </p:sp>
+      <p:grpSp>
+        <p:nvGrpSpPr>
+          <p:cNvPr id="20" name="Group 19">
+            <a:extLst>
+              <a:ext uri="{FF2B5EF4-FFF2-40B4-BE49-F238E27FC236}">
+                <a16:creationId xmlns:a16="http://schemas.microsoft.com/office/drawing/2014/main" id="{8DAA5F5F-7391-0757-ED51-B2A076CB5764}"/>
+              </a:ext>
+            </a:extLst>
+          </p:cNvPr>
+          <p:cNvGrpSpPr/>
+          <p:nvPr/>
+        </p:nvGrpSpPr>
+        <p:grpSpPr>
+          <a:xfrm>
+            <a:off x="291915" y="1430641"/>
+            <a:ext cx="6990154" cy="4676620"/>
+            <a:chOff x="291915" y="1430641"/>
+            <a:chExt cx="6990154" cy="4676620"/>
+          </a:xfrm>
+        </p:grpSpPr>
+        <p:grpSp>
+          <p:nvGrpSpPr>
+            <p:cNvPr id="8" name="Group 7">
+              <a:extLst>
+                <a:ext uri="{FF2B5EF4-FFF2-40B4-BE49-F238E27FC236}">
+                  <a16:creationId xmlns:a16="http://schemas.microsoft.com/office/drawing/2014/main" id="{F7FE39C5-F3D4-F2DE-5860-1D820A681912}"/>
+                </a:ext>
+              </a:extLst>
+            </p:cNvPr>
+            <p:cNvGrpSpPr/>
+            <p:nvPr/>
+          </p:nvGrpSpPr>
+          <p:grpSpPr>
+            <a:xfrm>
+              <a:off x="291915" y="2798201"/>
+              <a:ext cx="4459211" cy="3309060"/>
+              <a:chOff x="569989" y="2802835"/>
+              <a:chExt cx="4459211" cy="3309060"/>
+            </a:xfrm>
+          </p:grpSpPr>
+          <p:sp>
+            <p:nvSpPr>
+              <p:cNvPr id="3" name="Rectangle 2">
+                <a:extLst>
+                  <a:ext uri="{FF2B5EF4-FFF2-40B4-BE49-F238E27FC236}">
+                    <a16:creationId xmlns:a16="http://schemas.microsoft.com/office/drawing/2014/main" id="{1D75134E-B563-117E-CFCE-A09C97CE5246}"/>
+                  </a:ext>
+                </a:extLst>
+              </p:cNvPr>
+              <p:cNvSpPr/>
+              <p:nvPr/>
+            </p:nvSpPr>
+            <p:spPr>
+              <a:xfrm>
+                <a:off x="2799594" y="2802835"/>
+                <a:ext cx="2229606" cy="1659835"/>
+              </a:xfrm>
+              <a:prstGeom prst="rect">
+                <a:avLst/>
+              </a:prstGeom>
+              <a:noFill/>
+              <a:ln w="38100">
+                <a:solidFill>
+                  <a:srgbClr val="FF0000"/>
+                </a:solidFill>
+              </a:ln>
+            </p:spPr>
+            <p:style>
+              <a:lnRef idx="2">
+                <a:schemeClr val="accent1">
+                  <a:shade val="15000"/>
+                </a:schemeClr>
+              </a:lnRef>
+              <a:fillRef idx="1">
+                <a:schemeClr val="accent1"/>
+              </a:fillRef>
+              <a:effectRef idx="0">
+                <a:schemeClr val="accent1"/>
+              </a:effectRef>
+              <a:fontRef idx="minor">
+                <a:schemeClr val="lt1"/>
+              </a:fontRef>
+            </p:style>
+            <p:txBody>
+              <a:bodyPr rtlCol="0" anchor="ctr"/>
+              <a:lstStyle/>
+              <a:p>
+                <a:pPr algn="ctr"/>
+                <a:endParaRPr lang="en-US"/>
+              </a:p>
+            </p:txBody>
+          </p:sp>
+          <p:sp>
+            <p:nvSpPr>
+              <p:cNvPr id="5" name="Rectangle 4">
+                <a:extLst>
+                  <a:ext uri="{FF2B5EF4-FFF2-40B4-BE49-F238E27FC236}">
+                    <a16:creationId xmlns:a16="http://schemas.microsoft.com/office/drawing/2014/main" id="{384C68EF-E957-7E8E-CB30-07395B313E1B}"/>
+                  </a:ext>
+                </a:extLst>
+              </p:cNvPr>
+              <p:cNvSpPr/>
+              <p:nvPr/>
+            </p:nvSpPr>
+            <p:spPr>
+              <a:xfrm>
+                <a:off x="2799594" y="4452060"/>
+                <a:ext cx="2229606" cy="1659835"/>
+              </a:xfrm>
+              <a:prstGeom prst="rect">
+                <a:avLst/>
+              </a:prstGeom>
+              <a:noFill/>
+              <a:ln w="38100">
+                <a:solidFill>
+                  <a:srgbClr val="FF0000"/>
+                </a:solidFill>
+              </a:ln>
+            </p:spPr>
+            <p:style>
+              <a:lnRef idx="2">
+                <a:schemeClr val="accent1">
+                  <a:shade val="15000"/>
+                </a:schemeClr>
+              </a:lnRef>
+              <a:fillRef idx="1">
+                <a:schemeClr val="accent1"/>
+              </a:fillRef>
+              <a:effectRef idx="0">
+                <a:schemeClr val="accent1"/>
+              </a:effectRef>
+              <a:fontRef idx="minor">
+                <a:schemeClr val="lt1"/>
+              </a:fontRef>
+            </p:style>
+            <p:txBody>
+              <a:bodyPr rtlCol="0" anchor="ctr"/>
+              <a:lstStyle/>
+              <a:p>
+                <a:pPr algn="ctr"/>
+                <a:endParaRPr lang="en-US"/>
+              </a:p>
+            </p:txBody>
+          </p:sp>
+          <p:sp>
+            <p:nvSpPr>
+              <p:cNvPr id="7" name="Rectangle 6">
+                <a:extLst>
+                  <a:ext uri="{FF2B5EF4-FFF2-40B4-BE49-F238E27FC236}">
+                    <a16:creationId xmlns:a16="http://schemas.microsoft.com/office/drawing/2014/main" id="{282EB5F3-2F52-97CE-C44F-EE6C444C5E05}"/>
+                  </a:ext>
+                </a:extLst>
+              </p:cNvPr>
+              <p:cNvSpPr/>
+              <p:nvPr/>
+            </p:nvSpPr>
+            <p:spPr>
+              <a:xfrm>
+                <a:off x="569989" y="4452060"/>
+                <a:ext cx="2229606" cy="1659835"/>
+              </a:xfrm>
+              <a:prstGeom prst="rect">
+                <a:avLst/>
+              </a:prstGeom>
+              <a:noFill/>
+              <a:ln w="38100">
+                <a:solidFill>
+                  <a:srgbClr val="FF0000"/>
+                </a:solidFill>
+              </a:ln>
+            </p:spPr>
+            <p:style>
+              <a:lnRef idx="2">
+                <a:schemeClr val="accent1">
+                  <a:shade val="15000"/>
+                </a:schemeClr>
+              </a:lnRef>
+              <a:fillRef idx="1">
+                <a:schemeClr val="accent1"/>
+              </a:fillRef>
+              <a:effectRef idx="0">
+                <a:schemeClr val="accent1"/>
+              </a:effectRef>
+              <a:fontRef idx="minor">
+                <a:schemeClr val="lt1"/>
+              </a:fontRef>
+            </p:style>
+            <p:txBody>
+              <a:bodyPr rtlCol="0" anchor="ctr"/>
+              <a:lstStyle/>
+              <a:p>
+                <a:pPr algn="ctr"/>
+                <a:endParaRPr lang="en-US"/>
+              </a:p>
+            </p:txBody>
+          </p:sp>
+        </p:grpSp>
+        <p:sp>
+          <p:nvSpPr>
+            <p:cNvPr id="16" name="TextBox 15">
+              <a:extLst>
+                <a:ext uri="{FF2B5EF4-FFF2-40B4-BE49-F238E27FC236}">
+                  <a16:creationId xmlns:a16="http://schemas.microsoft.com/office/drawing/2014/main" id="{B373545D-56B8-62D3-0578-54667AA931FF}"/>
+                </a:ext>
+              </a:extLst>
+            </p:cNvPr>
+            <p:cNvSpPr txBox="1"/>
+            <p:nvPr/>
+          </p:nvSpPr>
+          <p:spPr>
+            <a:xfrm>
+              <a:off x="4937674" y="1430641"/>
+              <a:ext cx="2344395" cy="923247"/>
+            </a:xfrm>
+            <a:prstGeom prst="rect">
+              <a:avLst/>
+            </a:prstGeom>
+            <a:noFill/>
+            <a:ln w="28575">
+              <a:solidFill>
+                <a:srgbClr val="FF0000"/>
+              </a:solidFill>
+            </a:ln>
+          </p:spPr>
+          <p:txBody>
+            <a:bodyPr vert="horz" wrap="square" lIns="91440" tIns="45720" rIns="91440" bIns="45720" rtlCol="0">
+              <a:noAutofit/>
+            </a:bodyPr>
+            <a:lstStyle/>
+            <a:p>
+              <a:pPr fontAlgn="auto">
+                <a:spcBef>
+                  <a:spcPts val="0"/>
+                </a:spcBef>
+                <a:spcAft>
+                  <a:spcPts val="0"/>
+                </a:spcAft>
+                <a:buClr>
+                  <a:schemeClr val="bg1">
+                    <a:lumMod val="50000"/>
+                  </a:schemeClr>
+                </a:buClr>
+                <a:buSzPct val="100000"/>
+              </a:pPr>
+              <a:r>
+                <a:rPr lang="en-US" sz="2400" dirty="0">
+                  <a:solidFill>
+                    <a:srgbClr val="FF0000"/>
+                  </a:solidFill>
+                  <a:latin typeface="Helvetica Neue" panose="02000503000000020004" pitchFamily="2" charset="0"/>
+                  <a:ea typeface="Helvetica Neue" panose="02000503000000020004" pitchFamily="2" charset="0"/>
+                  <a:cs typeface="Helvetica Neue" panose="02000503000000020004" pitchFamily="2" charset="0"/>
+                </a:rPr>
+                <a:t>How are these different?</a:t>
+              </a:r>
+            </a:p>
+          </p:txBody>
+        </p:sp>
+      </p:grpSp>
+      <p:grpSp>
+        <p:nvGrpSpPr>
+          <p:cNvPr id="19" name="Group 18">
+            <a:extLst>
+              <a:ext uri="{FF2B5EF4-FFF2-40B4-BE49-F238E27FC236}">
+                <a16:creationId xmlns:a16="http://schemas.microsoft.com/office/drawing/2014/main" id="{D717173D-2E64-6BF7-7539-151ADF3428FB}"/>
+              </a:ext>
+            </a:extLst>
+          </p:cNvPr>
+          <p:cNvGrpSpPr/>
+          <p:nvPr/>
+        </p:nvGrpSpPr>
+        <p:grpSpPr>
+          <a:xfrm>
+            <a:off x="4827827" y="2830638"/>
+            <a:ext cx="4186604" cy="3383848"/>
+            <a:chOff x="4827827" y="2830638"/>
+            <a:chExt cx="4186604" cy="3383848"/>
+          </a:xfrm>
+        </p:grpSpPr>
+        <p:pic>
+          <p:nvPicPr>
+            <p:cNvPr id="2054" name="Picture 6">
+              <a:extLst>
+                <a:ext uri="{FF2B5EF4-FFF2-40B4-BE49-F238E27FC236}">
+                  <a16:creationId xmlns:a16="http://schemas.microsoft.com/office/drawing/2014/main" id="{5D1F67EC-372F-4245-835C-8AD095CA2402}"/>
+                </a:ext>
+              </a:extLst>
+            </p:cNvPr>
+            <p:cNvPicPr>
+              <a:picLocks noChangeAspect="1" noChangeArrowheads="1"/>
+            </p:cNvPicPr>
+            <p:nvPr/>
+          </p:nvPicPr>
+          <p:blipFill>
+            <a:blip r:embed="rId3">
+              <a:extLst>
+                <a:ext uri="{28A0092B-C50C-407E-A947-70E740481C1C}">
+                  <a14:useLocalDpi xmlns:a14="http://schemas.microsoft.com/office/drawing/2010/main" val="0"/>
+                </a:ext>
+              </a:extLst>
+            </a:blip>
+            <a:srcRect/>
+            <a:stretch>
+              <a:fillRect/>
+            </a:stretch>
+          </p:blipFill>
+          <p:spPr bwMode="auto">
+            <a:xfrm>
+              <a:off x="4827827" y="2830638"/>
+              <a:ext cx="4186604" cy="2777715"/>
+            </a:xfrm>
+            <a:prstGeom prst="rect">
+              <a:avLst/>
+            </a:prstGeom>
+            <a:noFill/>
+            <a:extLst>
+              <a:ext uri="{909E8E84-426E-40DD-AFC4-6F175D3DCCD1}">
+                <a14:hiddenFill xmlns:a14="http://schemas.microsoft.com/office/drawing/2010/main">
+                  <a:solidFill>
+                    <a:srgbClr val="FFFFFF"/>
+                  </a:solidFill>
+                </a14:hiddenFill>
+              </a:ext>
+            </a:extLst>
+          </p:spPr>
+        </p:pic>
+        <p:sp>
+          <p:nvSpPr>
+            <p:cNvPr id="17" name="TextBox 16">
+              <a:extLst>
+                <a:ext uri="{FF2B5EF4-FFF2-40B4-BE49-F238E27FC236}">
+                  <a16:creationId xmlns:a16="http://schemas.microsoft.com/office/drawing/2014/main" id="{31F8FDD8-D824-F811-9F1A-775D256F97D1}"/>
+                </a:ext>
+              </a:extLst>
+            </p:cNvPr>
+            <p:cNvSpPr txBox="1"/>
+            <p:nvPr/>
+          </p:nvSpPr>
+          <p:spPr>
+            <a:xfrm>
+              <a:off x="5105450" y="5628825"/>
+              <a:ext cx="3631358" cy="585661"/>
+            </a:xfrm>
+            <a:prstGeom prst="rect">
+              <a:avLst/>
+            </a:prstGeom>
+            <a:noFill/>
+            <a:ln w="12700">
+              <a:noFill/>
+            </a:ln>
+          </p:spPr>
+          <p:txBody>
+            <a:bodyPr vert="horz" wrap="square" lIns="91440" tIns="45720" rIns="91440" bIns="45720" rtlCol="0">
+              <a:noAutofit/>
+            </a:bodyPr>
+            <a:lstStyle/>
+            <a:p>
+              <a:pPr fontAlgn="auto">
+                <a:spcBef>
+                  <a:spcPts val="0"/>
+                </a:spcBef>
+                <a:spcAft>
+                  <a:spcPts val="0"/>
+                </a:spcAft>
+                <a:buClr>
+                  <a:schemeClr val="bg1">
+                    <a:lumMod val="50000"/>
+                  </a:schemeClr>
+                </a:buClr>
+                <a:buSzPct val="100000"/>
+              </a:pPr>
+              <a:r>
+                <a:rPr lang="en-US" sz="2400" dirty="0">
+                  <a:latin typeface="Helvetica Neue" panose="02000503000000020004" pitchFamily="2" charset="0"/>
+                  <a:ea typeface="Helvetica Neue" panose="02000503000000020004" pitchFamily="2" charset="0"/>
+                  <a:cs typeface="Helvetica Neue" panose="02000503000000020004" pitchFamily="2" charset="0"/>
+                </a:rPr>
+                <a:t>We live in an 8-bit world</a:t>
+              </a:r>
+            </a:p>
+          </p:txBody>
+        </p:sp>
+      </p:grpSp>
     </p:spTree>
     <p:extLst>
       <p:ext uri="{BB962C8B-B14F-4D97-AF65-F5344CB8AC3E}">
-        <p14:creationId xmlns:p14="http://schemas.microsoft.com/office/powerpoint/2010/main" val="2335424729"/>
+        <p14:creationId xmlns:p14="http://schemas.microsoft.com/office/powerpoint/2010/main" val="3021083564"/>
       </p:ext>
     </p:extLst>
   </p:cSld>
   <p:clrMapOvr>
     <a:masterClrMapping/>
   </p:clrMapOvr>
+  <p:timing>
+    <p:tnLst>
+      <p:par>
+        <p:cTn id="1" dur="indefinite" restart="never" nodeType="tmRoot">
+          <p:childTnLst>
+            <p:seq concurrent="1" nextAc="seek">
+              <p:cTn id="2" dur="indefinite" nodeType="mainSeq">
+                <p:childTnLst>
+                  <p:par>
+                    <p:cTn id="3" fill="hold">
+                      <p:stCondLst>
+                        <p:cond delay="indefinite"/>
+                      </p:stCondLst>
+                      <p:childTnLst>
+                        <p:par>
+                          <p:cTn id="4" fill="hold">
+                            <p:stCondLst>
+                              <p:cond delay="0"/>
+                            </p:stCondLst>
+                            <p:childTnLst>
+                              <p:par>
+                                <p:cTn id="5" presetID="1" presetClass="exit" presetSubtype="0" fill="hold" grpId="0" nodeType="clickEffect">
+                                  <p:stCondLst>
+                                    <p:cond delay="0"/>
+                                  </p:stCondLst>
+                                  <p:childTnLst>
+                                    <p:set>
+                                      <p:cBhvr>
+                                        <p:cTn id="6" dur="1" fill="hold">
+                                          <p:stCondLst>
+                                            <p:cond delay="0"/>
+                                          </p:stCondLst>
+                                        </p:cTn>
+                                        <p:tgtEl>
+                                          <p:spTgt spid="9"/>
+                                        </p:tgtEl>
+                                        <p:attrNameLst>
+                                          <p:attrName>style.visibility</p:attrName>
+                                        </p:attrNameLst>
+                                      </p:cBhvr>
+                                      <p:to>
+                                        <p:strVal val="hidden"/>
+                                      </p:to>
+                                    </p:set>
+                                  </p:childTnLst>
+                                </p:cTn>
+                              </p:par>
+                            </p:childTnLst>
+                          </p:cTn>
+                        </p:par>
+                      </p:childTnLst>
+                    </p:cTn>
+                  </p:par>
+                  <p:par>
+                    <p:cTn id="7" fill="hold">
+                      <p:stCondLst>
+                        <p:cond delay="indefinite"/>
+                      </p:stCondLst>
+                      <p:childTnLst>
+                        <p:par>
+                          <p:cTn id="8" fill="hold">
+                            <p:stCondLst>
+                              <p:cond delay="0"/>
+                            </p:stCondLst>
+                            <p:childTnLst>
+                              <p:par>
+                                <p:cTn id="9" presetID="1" presetClass="exit" presetSubtype="0" fill="hold" grpId="0" nodeType="clickEffect">
+                                  <p:stCondLst>
+                                    <p:cond delay="0"/>
+                                  </p:stCondLst>
+                                  <p:childTnLst>
+                                    <p:set>
+                                      <p:cBhvr>
+                                        <p:cTn id="10" dur="1" fill="hold">
+                                          <p:stCondLst>
+                                            <p:cond delay="0"/>
+                                          </p:stCondLst>
+                                        </p:cTn>
+                                        <p:tgtEl>
+                                          <p:spTgt spid="10"/>
+                                        </p:tgtEl>
+                                        <p:attrNameLst>
+                                          <p:attrName>style.visibility</p:attrName>
+                                        </p:attrNameLst>
+                                      </p:cBhvr>
+                                      <p:to>
+                                        <p:strVal val="hidden"/>
+                                      </p:to>
+                                    </p:set>
+                                  </p:childTnLst>
+                                </p:cTn>
+                              </p:par>
+                            </p:childTnLst>
+                          </p:cTn>
+                        </p:par>
+                      </p:childTnLst>
+                    </p:cTn>
+                  </p:par>
+                  <p:par>
+                    <p:cTn id="11" fill="hold">
+                      <p:stCondLst>
+                        <p:cond delay="indefinite"/>
+                      </p:stCondLst>
+                      <p:childTnLst>
+                        <p:par>
+                          <p:cTn id="12" fill="hold">
+                            <p:stCondLst>
+                              <p:cond delay="0"/>
+                            </p:stCondLst>
+                            <p:childTnLst>
+                              <p:par>
+                                <p:cTn id="13" presetID="1" presetClass="exit" presetSubtype="0" fill="hold" grpId="0" nodeType="clickEffect">
+                                  <p:stCondLst>
+                                    <p:cond delay="0"/>
+                                  </p:stCondLst>
+                                  <p:childTnLst>
+                                    <p:set>
+                                      <p:cBhvr>
+                                        <p:cTn id="14" dur="1" fill="hold">
+                                          <p:stCondLst>
+                                            <p:cond delay="0"/>
+                                          </p:stCondLst>
+                                        </p:cTn>
+                                        <p:tgtEl>
+                                          <p:spTgt spid="11"/>
+                                        </p:tgtEl>
+                                        <p:attrNameLst>
+                                          <p:attrName>style.visibility</p:attrName>
+                                        </p:attrNameLst>
+                                      </p:cBhvr>
+                                      <p:to>
+                                        <p:strVal val="hidden"/>
+                                      </p:to>
+                                    </p:set>
+                                  </p:childTnLst>
+                                </p:cTn>
+                              </p:par>
+                            </p:childTnLst>
+                          </p:cTn>
+                        </p:par>
+                      </p:childTnLst>
+                    </p:cTn>
+                  </p:par>
+                  <p:par>
+                    <p:cTn id="15" fill="hold">
+                      <p:stCondLst>
+                        <p:cond delay="indefinite"/>
+                      </p:stCondLst>
+                      <p:childTnLst>
+                        <p:par>
+                          <p:cTn id="16" fill="hold">
+                            <p:stCondLst>
+                              <p:cond delay="0"/>
+                            </p:stCondLst>
+                            <p:childTnLst>
+                              <p:par>
+                                <p:cTn id="17" presetID="1" presetClass="exit" presetSubtype="0" fill="hold" grpId="0" nodeType="clickEffect">
+                                  <p:stCondLst>
+                                    <p:cond delay="0"/>
+                                  </p:stCondLst>
+                                  <p:childTnLst>
+                                    <p:set>
+                                      <p:cBhvr>
+                                        <p:cTn id="18" dur="1" fill="hold">
+                                          <p:stCondLst>
+                                            <p:cond delay="0"/>
+                                          </p:stCondLst>
+                                        </p:cTn>
+                                        <p:tgtEl>
+                                          <p:spTgt spid="12"/>
+                                        </p:tgtEl>
+                                        <p:attrNameLst>
+                                          <p:attrName>style.visibility</p:attrName>
+                                        </p:attrNameLst>
+                                      </p:cBhvr>
+                                      <p:to>
+                                        <p:strVal val="hidden"/>
+                                      </p:to>
+                                    </p:set>
+                                  </p:childTnLst>
+                                </p:cTn>
+                              </p:par>
+                            </p:childTnLst>
+                          </p:cTn>
+                        </p:par>
+                      </p:childTnLst>
+                    </p:cTn>
+                  </p:par>
+                  <p:par>
+                    <p:cTn id="19" fill="hold">
+                      <p:stCondLst>
+                        <p:cond delay="indefinite"/>
+                      </p:stCondLst>
+                      <p:childTnLst>
+                        <p:par>
+                          <p:cTn id="20" fill="hold">
+                            <p:stCondLst>
+                              <p:cond delay="0"/>
+                            </p:stCondLst>
+                            <p:childTnLst>
+                              <p:par>
+                                <p:cTn id="21" presetID="1" presetClass="exit" presetSubtype="0" fill="hold" grpId="0" nodeType="clickEffect">
+                                  <p:stCondLst>
+                                    <p:cond delay="0"/>
+                                  </p:stCondLst>
+                                  <p:childTnLst>
+                                    <p:set>
+                                      <p:cBhvr>
+                                        <p:cTn id="22" dur="1" fill="hold">
+                                          <p:stCondLst>
+                                            <p:cond delay="0"/>
+                                          </p:stCondLst>
+                                        </p:cTn>
+                                        <p:tgtEl>
+                                          <p:spTgt spid="13"/>
+                                        </p:tgtEl>
+                                        <p:attrNameLst>
+                                          <p:attrName>style.visibility</p:attrName>
+                                        </p:attrNameLst>
+                                      </p:cBhvr>
+                                      <p:to>
+                                        <p:strVal val="hidden"/>
+                                      </p:to>
+                                    </p:set>
+                                  </p:childTnLst>
+                                </p:cTn>
+                              </p:par>
+                            </p:childTnLst>
+                          </p:cTn>
+                        </p:par>
+                      </p:childTnLst>
+                    </p:cTn>
+                  </p:par>
+                  <p:par>
+                    <p:cTn id="23" fill="hold">
+                      <p:stCondLst>
+                        <p:cond delay="indefinite"/>
+                      </p:stCondLst>
+                      <p:childTnLst>
+                        <p:par>
+                          <p:cTn id="24" fill="hold">
+                            <p:stCondLst>
+                              <p:cond delay="0"/>
+                            </p:stCondLst>
+                            <p:childTnLst>
+                              <p:par>
+                                <p:cTn id="25" presetID="1" presetClass="entr" presetSubtype="0" fill="hold" nodeType="clickEffect">
+                                  <p:stCondLst>
+                                    <p:cond delay="0"/>
+                                  </p:stCondLst>
+                                  <p:childTnLst>
+                                    <p:set>
+                                      <p:cBhvr>
+                                        <p:cTn id="26" dur="1" fill="hold">
+                                          <p:stCondLst>
+                                            <p:cond delay="0"/>
+                                          </p:stCondLst>
+                                        </p:cTn>
+                                        <p:tgtEl>
+                                          <p:spTgt spid="20"/>
+                                        </p:tgtEl>
+                                        <p:attrNameLst>
+                                          <p:attrName>style.visibility</p:attrName>
+                                        </p:attrNameLst>
+                                      </p:cBhvr>
+                                      <p:to>
+                                        <p:strVal val="visible"/>
+                                      </p:to>
+                                    </p:set>
+                                  </p:childTnLst>
+                                </p:cTn>
+                              </p:par>
+                            </p:childTnLst>
+                          </p:cTn>
+                        </p:par>
+                      </p:childTnLst>
+                    </p:cTn>
+                  </p:par>
+                  <p:par>
+                    <p:cTn id="27" fill="hold">
+                      <p:stCondLst>
+                        <p:cond delay="indefinite"/>
+                      </p:stCondLst>
+                      <p:childTnLst>
+                        <p:par>
+                          <p:cTn id="28" fill="hold">
+                            <p:stCondLst>
+                              <p:cond delay="0"/>
+                            </p:stCondLst>
+                            <p:childTnLst>
+                              <p:par>
+                                <p:cTn id="29" presetID="1" presetClass="entr" presetSubtype="0" fill="hold" nodeType="clickEffect">
+                                  <p:stCondLst>
+                                    <p:cond delay="0"/>
+                                  </p:stCondLst>
+                                  <p:childTnLst>
+                                    <p:set>
+                                      <p:cBhvr>
+                                        <p:cTn id="30" dur="1" fill="hold">
+                                          <p:stCondLst>
+                                            <p:cond delay="0"/>
+                                          </p:stCondLst>
+                                        </p:cTn>
+                                        <p:tgtEl>
+                                          <p:spTgt spid="19"/>
+                                        </p:tgtEl>
+                                        <p:attrNameLst>
+                                          <p:attrName>style.visibility</p:attrName>
+                                        </p:attrNameLst>
+                                      </p:cBhvr>
+                                      <p:to>
+                                        <p:strVal val="visible"/>
+                                      </p:to>
+                                    </p:set>
+                                  </p:childTnLst>
+                                </p:cTn>
+                              </p:par>
+                            </p:childTnLst>
+                          </p:cTn>
+                        </p:par>
+                      </p:childTnLst>
+                    </p:cTn>
+                  </p:par>
+                </p:childTnLst>
+              </p:cTn>
+              <p:prevCondLst>
+                <p:cond evt="onPrev" delay="0">
+                  <p:tgtEl>
+                    <p:sldTgt/>
+                  </p:tgtEl>
+                </p:cond>
+              </p:prevCondLst>
+              <p:nextCondLst>
+                <p:cond evt="onNext" delay="0">
+                  <p:tgtEl>
+                    <p:sldTgt/>
+                  </p:tgtEl>
+                </p:cond>
+              </p:nextCondLst>
+            </p:seq>
+          </p:childTnLst>
+        </p:cTn>
+      </p:par>
+    </p:tnLst>
+    <p:bldLst>
+      <p:bldP spid="9" grpId="0" animBg="1"/>
+      <p:bldP spid="10" grpId="0" animBg="1"/>
+      <p:bldP spid="11" grpId="0" animBg="1"/>
+      <p:bldP spid="12" grpId="0" animBg="1"/>
+      <p:bldP spid="13" grpId="0" animBg="1"/>
+    </p:bldLst>
+  </p:timing>
 </p:sld>
 </file>
 
@@ -20227,7 +21559,7 @@
               </a:spcAft>
             </a:pPr>
             <a:r>
-              <a:rPr lang="en-US" sz="3600" b="1" dirty="0">
+              <a:rPr lang="en-US" b="1" dirty="0">
                 <a:solidFill>
                   <a:schemeClr val="tx1">
                     <a:lumMod val="65000"/>
@@ -20236,7 +21568,7 @@
                 </a:solidFill>
                 <a:latin typeface="Garamond" panose="02020404030301010803" pitchFamily="18" charset="0"/>
               </a:rPr>
-              <a:t>Game 2: Guess that card!</a:t>
+              <a:t>Information in quantum physics</a:t>
             </a:r>
           </a:p>
         </p:txBody>
@@ -20285,10 +21617,10 @@
       </p:sp>
       <p:sp>
         <p:nvSpPr>
-          <p:cNvPr id="9" name="TextBox 8">
+          <p:cNvPr id="21" name="TextBox 20">
             <a:extLst>
               <a:ext uri="{FF2B5EF4-FFF2-40B4-BE49-F238E27FC236}">
-                <a16:creationId xmlns:a16="http://schemas.microsoft.com/office/drawing/2014/main" id="{3DE81A93-0D65-7042-97C9-B64E2BB1820C}"/>
+                <a16:creationId xmlns:a16="http://schemas.microsoft.com/office/drawing/2014/main" id="{719ECCFE-5005-344D-BA7B-9CC92AD6F5A6}"/>
               </a:ext>
             </a:extLst>
           </p:cNvPr>
@@ -20297,8 +21629,8 @@
         </p:nvSpPr>
         <p:spPr>
           <a:xfrm>
-            <a:off x="255179" y="3645573"/>
-            <a:ext cx="8633637" cy="501125"/>
+            <a:off x="0" y="6538912"/>
+            <a:ext cx="5599191" cy="319088"/>
           </a:xfrm>
           <a:prstGeom prst="rect">
             <a:avLst/>
@@ -20314,62 +21646,104 @@
           </a:bodyPr>
           <a:lstStyle/>
           <a:p>
-            <a:pPr marL="457200" indent="-457200" fontAlgn="auto">
+            <a:pPr fontAlgn="auto">
               <a:spcBef>
                 <a:spcPts val="0"/>
               </a:spcBef>
               <a:spcAft>
-                <a:spcPts val="1200"/>
+                <a:spcPts val="600"/>
               </a:spcAft>
               <a:buClr>
-                <a:schemeClr val="bg1">
-                  <a:lumMod val="50000"/>
-                </a:schemeClr>
+                <a:srgbClr val="0070C0"/>
               </a:buClr>
               <a:buSzPct val="100000"/>
-              <a:buFont typeface="Arial" panose="020B0604020202020204" pitchFamily="34" charset="0"/>
-              <a:buChar char="•"/>
             </a:pPr>
             <a:r>
-              <a:rPr lang="en-US" sz="2400" dirty="0">
-                <a:latin typeface="Helvetica Neue" panose="02000503000000020004" pitchFamily="2" charset="0"/>
-                <a:ea typeface="Helvetica Neue" panose="02000503000000020004" pitchFamily="2" charset="0"/>
-                <a:cs typeface="Helvetica Neue" panose="02000503000000020004" pitchFamily="2" charset="0"/>
-              </a:rPr>
-              <a:t>Hidden: a single card draw, standard 52-card deck</a:t>
-            </a:r>
-          </a:p>
-          <a:p>
-            <a:pPr marL="457200" indent="-457200" fontAlgn="auto">
-              <a:spcBef>
-                <a:spcPts val="0"/>
-              </a:spcBef>
-              <a:spcAft>
-                <a:spcPts val="1200"/>
-              </a:spcAft>
-              <a:buClr>
-                <a:schemeClr val="bg1">
-                  <a:lumMod val="50000"/>
-                </a:schemeClr>
-              </a:buClr>
-              <a:buSzPct val="100000"/>
-              <a:buFont typeface="Arial" panose="020B0604020202020204" pitchFamily="34" charset="0"/>
-              <a:buChar char="•"/>
-            </a:pPr>
-            <a:endParaRPr lang="en-US" sz="2400" dirty="0">
-              <a:latin typeface="Helvetica Neue" panose="02000503000000020004" pitchFamily="2" charset="0"/>
-              <a:ea typeface="Helvetica Neue" panose="02000503000000020004" pitchFamily="2" charset="0"/>
-              <a:cs typeface="Helvetica Neue" panose="02000503000000020004" pitchFamily="2" charset="0"/>
-            </a:endParaRPr>
+              <a:rPr lang="en-US" sz="800" dirty="0">
+                <a:solidFill>
+                  <a:prstClr val="black"/>
+                </a:solidFill>
+                <a:latin typeface="Helvetica Neue" panose="02000503000000020004" pitchFamily="2" charset="0"/>
+                <a:ea typeface="Helvetica Neue" panose="02000503000000020004" pitchFamily="2" charset="0"/>
+                <a:cs typeface="Helvetica Neue" panose="02000503000000020004" pitchFamily="2" charset="0"/>
+              </a:rPr>
+              <a:t>https://</a:t>
+            </a:r>
+            <a:r>
+              <a:rPr lang="en-US" sz="800" dirty="0" err="1">
+                <a:solidFill>
+                  <a:prstClr val="black"/>
+                </a:solidFill>
+                <a:latin typeface="Helvetica Neue" panose="02000503000000020004" pitchFamily="2" charset="0"/>
+                <a:ea typeface="Helvetica Neue" panose="02000503000000020004" pitchFamily="2" charset="0"/>
+                <a:cs typeface="Helvetica Neue" panose="02000503000000020004" pitchFamily="2" charset="0"/>
+              </a:rPr>
+              <a:t>en.wikipedia.org</a:t>
+            </a:r>
+            <a:r>
+              <a:rPr lang="en-US" sz="800" dirty="0">
+                <a:solidFill>
+                  <a:prstClr val="black"/>
+                </a:solidFill>
+                <a:latin typeface="Helvetica Neue" panose="02000503000000020004" pitchFamily="2" charset="0"/>
+                <a:ea typeface="Helvetica Neue" panose="02000503000000020004" pitchFamily="2" charset="0"/>
+                <a:cs typeface="Helvetica Neue" panose="02000503000000020004" pitchFamily="2" charset="0"/>
+              </a:rPr>
+              <a:t>/wiki/</a:t>
+            </a:r>
+            <a:r>
+              <a:rPr lang="en-US" sz="800" dirty="0" err="1">
+                <a:solidFill>
+                  <a:prstClr val="black"/>
+                </a:solidFill>
+                <a:latin typeface="Helvetica Neue" panose="02000503000000020004" pitchFamily="2" charset="0"/>
+                <a:ea typeface="Helvetica Neue" panose="02000503000000020004" pitchFamily="2" charset="0"/>
+                <a:cs typeface="Helvetica Neue" panose="02000503000000020004" pitchFamily="2" charset="0"/>
+              </a:rPr>
+              <a:t>Black_hole_information_paradox</a:t>
+            </a:r>
+            <a:r>
+              <a:rPr lang="en-US" sz="800" dirty="0">
+                <a:solidFill>
+                  <a:prstClr val="black"/>
+                </a:solidFill>
+                <a:latin typeface="Helvetica Neue" panose="02000503000000020004" pitchFamily="2" charset="0"/>
+                <a:ea typeface="Helvetica Neue" panose="02000503000000020004" pitchFamily="2" charset="0"/>
+                <a:cs typeface="Helvetica Neue" panose="02000503000000020004" pitchFamily="2" charset="0"/>
+              </a:rPr>
+              <a:t>#/media/File:Black_hole_-_Messier_87_crop_max_res.jpg, https://</a:t>
+            </a:r>
+            <a:r>
+              <a:rPr lang="en-US" sz="800" dirty="0" err="1">
+                <a:solidFill>
+                  <a:prstClr val="black"/>
+                </a:solidFill>
+                <a:latin typeface="Helvetica Neue" panose="02000503000000020004" pitchFamily="2" charset="0"/>
+                <a:ea typeface="Helvetica Neue" panose="02000503000000020004" pitchFamily="2" charset="0"/>
+                <a:cs typeface="Helvetica Neue" panose="02000503000000020004" pitchFamily="2" charset="0"/>
+              </a:rPr>
+              <a:t>www.secretsofuniverse.in</a:t>
+            </a:r>
+            <a:r>
+              <a:rPr lang="en-US" sz="800" dirty="0">
+                <a:solidFill>
+                  <a:prstClr val="black"/>
+                </a:solidFill>
+                <a:latin typeface="Helvetica Neue" panose="02000503000000020004" pitchFamily="2" charset="0"/>
+                <a:ea typeface="Helvetica Neue" panose="02000503000000020004" pitchFamily="2" charset="0"/>
+                <a:cs typeface="Helvetica Neue" panose="02000503000000020004" pitchFamily="2" charset="0"/>
+              </a:rPr>
+              <a:t>/hawking-radiation-from-black-holes/</a:t>
+            </a:r>
           </a:p>
         </p:txBody>
       </p:sp>
       <p:pic>
         <p:nvPicPr>
-          <p:cNvPr id="6" name="Picture 4" descr="Best 500+ Cards Pictures | Download Free Images on Unsplash">
+          <p:cNvPr id="3074" name="Picture 2">
             <a:extLst>
               <a:ext uri="{FF2B5EF4-FFF2-40B4-BE49-F238E27FC236}">
-                <a16:creationId xmlns:a16="http://schemas.microsoft.com/office/drawing/2014/main" id="{2B90ABC5-E171-6E48-B419-176B1A4E75BB}"/>
+                <a16:creationId xmlns:a16="http://schemas.microsoft.com/office/drawing/2014/main" id="{A73EE32B-5C91-066D-0C24-74F3426BE060}"/>
               </a:ext>
             </a:extLst>
           </p:cNvPr>
@@ -20378,7 +21752,7 @@
           </p:cNvPicPr>
           <p:nvPr/>
         </p:nvPicPr>
-        <p:blipFill rotWithShape="1">
+        <p:blipFill>
           <a:blip r:embed="rId2">
             <a:extLst>
               <a:ext uri="{28A0092B-C50C-407E-A947-70E740481C1C}">
@@ -20386,13 +21760,15 @@
               </a:ext>
             </a:extLst>
           </a:blip>
-          <a:srcRect b="19145"/>
-          <a:stretch/>
+          <a:srcRect/>
+          <a:stretch>
+            <a:fillRect/>
+          </a:stretch>
         </p:blipFill>
         <p:spPr bwMode="auto">
           <a:xfrm>
-            <a:off x="2622549" y="1109693"/>
-            <a:ext cx="3898899" cy="2102735"/>
+            <a:off x="254686" y="1097334"/>
+            <a:ext cx="3810000" cy="3810000"/>
           </a:xfrm>
           <a:prstGeom prst="rect">
             <a:avLst/>
@@ -20409,234 +21785,336 @@
           </a:extLst>
         </p:spPr>
       </p:pic>
-      <p:graphicFrame>
-        <p:nvGraphicFramePr>
-          <p:cNvPr id="3" name="Table 4">
+      <p:pic>
+        <p:nvPicPr>
+          <p:cNvPr id="3076" name="Picture 4" descr="The Concept Of Hawking Radiation From Black Holes">
             <a:extLst>
               <a:ext uri="{FF2B5EF4-FFF2-40B4-BE49-F238E27FC236}">
-                <a16:creationId xmlns:a16="http://schemas.microsoft.com/office/drawing/2014/main" id="{8E1EF8E4-B605-0246-A34B-74F6B694651A}"/>
+                <a16:creationId xmlns:a16="http://schemas.microsoft.com/office/drawing/2014/main" id="{8CB73494-4A07-5507-C0F7-E204D56D8D81}"/>
               </a:ext>
             </a:extLst>
           </p:cNvPr>
-          <p:cNvGraphicFramePr>
-            <a:graphicFrameLocks noGrp="1"/>
-          </p:cNvGraphicFramePr>
-          <p:nvPr>
-            <p:extLst>
-              <p:ext uri="{D42A27DB-BD31-4B8C-83A1-F6EECF244321}">
-                <p14:modId xmlns:p14="http://schemas.microsoft.com/office/powerpoint/2010/main" val="943526752"/>
-              </p:ext>
-            </p:extLst>
-          </p:nvPr>
-        </p:nvGraphicFramePr>
-        <p:xfrm>
-          <a:off x="510362" y="4365594"/>
-          <a:ext cx="8176438" cy="1483360"/>
-        </p:xfrm>
-        <a:graphic>
-          <a:graphicData uri="http://schemas.openxmlformats.org/drawingml/2006/table">
-            <a:tbl>
-              <a:tblPr firstRow="1" bandRow="1">
-                <a:tableStyleId>{69012ECD-51FC-41F1-AA8D-1B2483CD663E}</a:tableStyleId>
-              </a:tblPr>
-              <a:tblGrid>
-                <a:gridCol w="3104708">
-                  <a:extLst>
-                    <a:ext uri="{9D8B030D-6E8A-4147-A177-3AD203B41FA5}">
-                      <a16:colId xmlns:a16="http://schemas.microsoft.com/office/drawing/2014/main" val="1078569031"/>
-                    </a:ext>
-                  </a:extLst>
-                </a:gridCol>
-                <a:gridCol w="5071730">
-                  <a:extLst>
-                    <a:ext uri="{9D8B030D-6E8A-4147-A177-3AD203B41FA5}">
-                      <a16:colId xmlns:a16="http://schemas.microsoft.com/office/drawing/2014/main" val="1676411733"/>
-                    </a:ext>
-                  </a:extLst>
-                </a:gridCol>
-              </a:tblGrid>
-              <a:tr h="370840">
-                <a:tc>
-                  <a:txBody>
-                    <a:bodyPr/>
-                    <a:lstStyle/>
-                    <a:p>
-                      <a:r>
-                        <a:rPr lang="en-US" dirty="0">
-                          <a:latin typeface="Helvetica Neue" panose="02000503000000020004" pitchFamily="2" charset="0"/>
-                          <a:ea typeface="Helvetica Neue" panose="02000503000000020004" pitchFamily="2" charset="0"/>
-                          <a:cs typeface="Helvetica Neue" panose="02000503000000020004" pitchFamily="2" charset="0"/>
-                        </a:rPr>
-                        <a:t>Guess</a:t>
-                      </a:r>
-                    </a:p>
-                  </a:txBody>
-                  <a:tcPr/>
-                </a:tc>
-                <a:tc>
-                  <a:txBody>
-                    <a:bodyPr/>
-                    <a:lstStyle/>
-                    <a:p>
-                      <a:r>
-                        <a:rPr lang="en-US" dirty="0">
-                          <a:latin typeface="Helvetica Neue" panose="02000503000000020004" pitchFamily="2" charset="0"/>
-                          <a:ea typeface="Helvetica Neue" panose="02000503000000020004" pitchFamily="2" charset="0"/>
-                          <a:cs typeface="Helvetica Neue" panose="02000503000000020004" pitchFamily="2" charset="0"/>
-                        </a:rPr>
-                        <a:t>Reveal</a:t>
-                      </a:r>
-                    </a:p>
-                  </a:txBody>
-                  <a:tcPr/>
-                </a:tc>
-                <a:extLst>
-                  <a:ext uri="{0D108BD9-81ED-4DB2-BD59-A6C34878D82A}">
-                    <a16:rowId xmlns:a16="http://schemas.microsoft.com/office/drawing/2014/main" val="3025018645"/>
-                  </a:ext>
-                </a:extLst>
-              </a:tr>
-              <a:tr h="370840">
-                <a:tc>
-                  <a:txBody>
-                    <a:bodyPr/>
-                    <a:lstStyle/>
-                    <a:p>
-                      <a:r>
-                        <a:rPr lang="en-US" dirty="0">
-                          <a:latin typeface="Helvetica Neue" panose="02000503000000020004" pitchFamily="2" charset="0"/>
-                          <a:ea typeface="Helvetica Neue" panose="02000503000000020004" pitchFamily="2" charset="0"/>
-                          <a:cs typeface="Helvetica Neue" panose="02000503000000020004" pitchFamily="2" charset="0"/>
-                        </a:rPr>
-                        <a:t>Value</a:t>
-                      </a:r>
-                    </a:p>
-                  </a:txBody>
-                  <a:tcPr/>
-                </a:tc>
-                <a:tc>
-                  <a:txBody>
-                    <a:bodyPr/>
-                    <a:lstStyle/>
-                    <a:p>
-                      <a:r>
-                        <a:rPr lang="en-US" dirty="0">
-                          <a:latin typeface="Helvetica Neue" panose="02000503000000020004" pitchFamily="2" charset="0"/>
-                          <a:ea typeface="Helvetica Neue" panose="02000503000000020004" pitchFamily="2" charset="0"/>
-                          <a:cs typeface="Helvetica Neue" panose="02000503000000020004" pitchFamily="2" charset="0"/>
-                        </a:rPr>
-                        <a:t>“Match” OR “higher” OR “lower”</a:t>
-                      </a:r>
-                    </a:p>
-                  </a:txBody>
-                  <a:tcPr/>
-                </a:tc>
-                <a:extLst>
-                  <a:ext uri="{0D108BD9-81ED-4DB2-BD59-A6C34878D82A}">
-                    <a16:rowId xmlns:a16="http://schemas.microsoft.com/office/drawing/2014/main" val="3200569398"/>
-                  </a:ext>
-                </a:extLst>
-              </a:tr>
-              <a:tr h="370840">
-                <a:tc>
-                  <a:txBody>
-                    <a:bodyPr/>
-                    <a:lstStyle/>
-                    <a:p>
-                      <a:r>
-                        <a:rPr lang="en-US" dirty="0">
-                          <a:latin typeface="Helvetica Neue" panose="02000503000000020004" pitchFamily="2" charset="0"/>
-                          <a:ea typeface="Helvetica Neue" panose="02000503000000020004" pitchFamily="2" charset="0"/>
-                          <a:cs typeface="Helvetica Neue" panose="02000503000000020004" pitchFamily="2" charset="0"/>
-                        </a:rPr>
-                        <a:t>Suit</a:t>
-                      </a:r>
-                    </a:p>
-                  </a:txBody>
-                  <a:tcPr/>
-                </a:tc>
-                <a:tc>
-                  <a:txBody>
-                    <a:bodyPr/>
-                    <a:lstStyle/>
-                    <a:p>
-                      <a:r>
-                        <a:rPr lang="en-US" dirty="0">
-                          <a:latin typeface="Helvetica Neue" panose="02000503000000020004" pitchFamily="2" charset="0"/>
-                          <a:ea typeface="Helvetica Neue" panose="02000503000000020004" pitchFamily="2" charset="0"/>
-                          <a:cs typeface="Helvetica Neue" panose="02000503000000020004" pitchFamily="2" charset="0"/>
-                        </a:rPr>
-                        <a:t>“Yes” OR “No”</a:t>
-                      </a:r>
-                    </a:p>
-                  </a:txBody>
-                  <a:tcPr/>
-                </a:tc>
-                <a:extLst>
-                  <a:ext uri="{0D108BD9-81ED-4DB2-BD59-A6C34878D82A}">
-                    <a16:rowId xmlns:a16="http://schemas.microsoft.com/office/drawing/2014/main" val="554618638"/>
-                  </a:ext>
-                </a:extLst>
-              </a:tr>
-              <a:tr h="370840">
-                <a:tc>
-                  <a:txBody>
-                    <a:bodyPr/>
-                    <a:lstStyle/>
-                    <a:p>
-                      <a:r>
-                        <a:rPr lang="en-US" dirty="0">
-                          <a:latin typeface="Helvetica Neue" panose="02000503000000020004" pitchFamily="2" charset="0"/>
-                          <a:ea typeface="Helvetica Neue" panose="02000503000000020004" pitchFamily="2" charset="0"/>
-                          <a:cs typeface="Helvetica Neue" panose="02000503000000020004" pitchFamily="2" charset="0"/>
-                        </a:rPr>
-                        <a:t>Color</a:t>
-                      </a:r>
-                    </a:p>
-                  </a:txBody>
-                  <a:tcPr/>
-                </a:tc>
-                <a:tc>
-                  <a:txBody>
-                    <a:bodyPr/>
-                    <a:lstStyle/>
-                    <a:p>
-                      <a:r>
-                        <a:rPr lang="en-US" dirty="0">
-                          <a:latin typeface="Helvetica Neue" panose="02000503000000020004" pitchFamily="2" charset="0"/>
-                          <a:ea typeface="Helvetica Neue" panose="02000503000000020004" pitchFamily="2" charset="0"/>
-                          <a:cs typeface="Helvetica Neue" panose="02000503000000020004" pitchFamily="2" charset="0"/>
-                        </a:rPr>
-                        <a:t>“Yes” OR “No”</a:t>
-                      </a:r>
-                    </a:p>
-                  </a:txBody>
-                  <a:tcPr/>
-                </a:tc>
-                <a:extLst>
-                  <a:ext uri="{0D108BD9-81ED-4DB2-BD59-A6C34878D82A}">
-                    <a16:rowId xmlns:a16="http://schemas.microsoft.com/office/drawing/2014/main" val="1880239348"/>
-                  </a:ext>
-                </a:extLst>
-              </a:tr>
-            </a:tbl>
-          </a:graphicData>
-        </a:graphic>
-      </p:graphicFrame>
+          <p:cNvPicPr>
+            <a:picLocks noChangeAspect="1" noChangeArrowheads="1"/>
+          </p:cNvPicPr>
+          <p:nvPr/>
+        </p:nvPicPr>
+        <p:blipFill>
+          <a:blip r:embed="rId3">
+            <a:extLst>
+              <a:ext uri="{28A0092B-C50C-407E-A947-70E740481C1C}">
+                <a14:useLocalDpi xmlns:a14="http://schemas.microsoft.com/office/drawing/2010/main" val="0"/>
+              </a:ext>
+            </a:extLst>
+          </a:blip>
+          <a:srcRect/>
+          <a:stretch>
+            <a:fillRect/>
+          </a:stretch>
+        </p:blipFill>
+        <p:spPr bwMode="auto">
+          <a:xfrm>
+            <a:off x="4242972" y="1097334"/>
+            <a:ext cx="4646342" cy="3810000"/>
+          </a:xfrm>
+          <a:prstGeom prst="rect">
+            <a:avLst/>
+          </a:prstGeom>
+          <a:noFill/>
+          <a:extLst>
+            <a:ext uri="{909E8E84-426E-40DD-AFC4-6F175D3DCCD1}">
+              <a14:hiddenFill xmlns:a14="http://schemas.microsoft.com/office/drawing/2010/main">
+                <a:solidFill>
+                  <a:srgbClr val="FFFFFF"/>
+                </a:solidFill>
+              </a14:hiddenFill>
+            </a:ext>
+          </a:extLst>
+        </p:spPr>
+      </p:pic>
+      <p:sp>
+        <p:nvSpPr>
+          <p:cNvPr id="6" name="TextBox 5">
+            <a:extLst>
+              <a:ext uri="{FF2B5EF4-FFF2-40B4-BE49-F238E27FC236}">
+                <a16:creationId xmlns:a16="http://schemas.microsoft.com/office/drawing/2014/main" id="{9BE1D632-CD21-4A57-D1E7-59D14ACED137}"/>
+              </a:ext>
+            </a:extLst>
+          </p:cNvPr>
+          <p:cNvSpPr txBox="1"/>
+          <p:nvPr/>
+        </p:nvSpPr>
+        <p:spPr>
+          <a:xfrm>
+            <a:off x="254686" y="4979380"/>
+            <a:ext cx="8634628" cy="1463461"/>
+          </a:xfrm>
+          <a:prstGeom prst="rect">
+            <a:avLst/>
+          </a:prstGeom>
+          <a:noFill/>
+          <a:ln w="12700">
+            <a:noFill/>
+          </a:ln>
+        </p:spPr>
+        <p:txBody>
+          <a:bodyPr vert="horz" wrap="square" lIns="91440" tIns="45720" rIns="91440" bIns="45720" rtlCol="0">
+            <a:noAutofit/>
+          </a:bodyPr>
+          <a:lstStyle/>
+          <a:p>
+            <a:pPr fontAlgn="auto">
+              <a:spcBef>
+                <a:spcPts val="0"/>
+              </a:spcBef>
+              <a:spcAft>
+                <a:spcPts val="0"/>
+              </a:spcAft>
+              <a:buClr>
+                <a:schemeClr val="bg1">
+                  <a:lumMod val="50000"/>
+                </a:schemeClr>
+              </a:buClr>
+              <a:buSzPct val="100000"/>
+            </a:pPr>
+            <a:r>
+              <a:rPr lang="en-US" sz="1600" dirty="0">
+                <a:latin typeface="Helvetica Neue" panose="02000503000000020004" pitchFamily="2" charset="0"/>
+                <a:ea typeface="Helvetica Neue" panose="02000503000000020004" pitchFamily="2" charset="0"/>
+                <a:cs typeface="Helvetica Neue" panose="02000503000000020004" pitchFamily="2" charset="0"/>
+              </a:rPr>
+              <a:t>Black holes predicted to (very slowly) evaporate</a:t>
+            </a:r>
+          </a:p>
+          <a:p>
+            <a:pPr fontAlgn="auto">
+              <a:spcBef>
+                <a:spcPts val="0"/>
+              </a:spcBef>
+              <a:spcAft>
+                <a:spcPts val="0"/>
+              </a:spcAft>
+              <a:buClr>
+                <a:schemeClr val="bg1">
+                  <a:lumMod val="50000"/>
+                </a:schemeClr>
+              </a:buClr>
+              <a:buSzPct val="100000"/>
+            </a:pPr>
+            <a:endParaRPr lang="en-US" sz="1600" dirty="0">
+              <a:latin typeface="Helvetica Neue" panose="02000503000000020004" pitchFamily="2" charset="0"/>
+              <a:ea typeface="Helvetica Neue" panose="02000503000000020004" pitchFamily="2" charset="0"/>
+              <a:cs typeface="Helvetica Neue" panose="02000503000000020004" pitchFamily="2" charset="0"/>
+            </a:endParaRPr>
+          </a:p>
+          <a:p>
+            <a:pPr fontAlgn="auto">
+              <a:spcBef>
+                <a:spcPts val="0"/>
+              </a:spcBef>
+              <a:spcAft>
+                <a:spcPts val="0"/>
+              </a:spcAft>
+              <a:buClr>
+                <a:schemeClr val="bg1">
+                  <a:lumMod val="50000"/>
+                </a:schemeClr>
+              </a:buClr>
+              <a:buSzPct val="100000"/>
+            </a:pPr>
+            <a:r>
+              <a:rPr lang="en-US" sz="1600" dirty="0">
+                <a:latin typeface="Helvetica Neue" panose="02000503000000020004" pitchFamily="2" charset="0"/>
+                <a:ea typeface="Helvetica Neue" panose="02000503000000020004" pitchFamily="2" charset="0"/>
+                <a:cs typeface="Helvetica Neue" panose="02000503000000020004" pitchFamily="2" charset="0"/>
+              </a:rPr>
+              <a:t>Is the information about what disappears preserved?</a:t>
+            </a:r>
+          </a:p>
+          <a:p>
+            <a:pPr fontAlgn="auto">
+              <a:spcBef>
+                <a:spcPts val="0"/>
+              </a:spcBef>
+              <a:spcAft>
+                <a:spcPts val="0"/>
+              </a:spcAft>
+              <a:buClr>
+                <a:schemeClr val="bg1">
+                  <a:lumMod val="50000"/>
+                </a:schemeClr>
+              </a:buClr>
+              <a:buSzPct val="100000"/>
+            </a:pPr>
+            <a:endParaRPr lang="en-US" sz="1600" dirty="0">
+              <a:latin typeface="Helvetica Neue" panose="02000503000000020004" pitchFamily="2" charset="0"/>
+              <a:ea typeface="Helvetica Neue" panose="02000503000000020004" pitchFamily="2" charset="0"/>
+              <a:cs typeface="Helvetica Neue" panose="02000503000000020004" pitchFamily="2" charset="0"/>
+            </a:endParaRPr>
+          </a:p>
+          <a:p>
+            <a:pPr fontAlgn="auto">
+              <a:spcBef>
+                <a:spcPts val="0"/>
+              </a:spcBef>
+              <a:spcAft>
+                <a:spcPts val="0"/>
+              </a:spcAft>
+              <a:buClr>
+                <a:schemeClr val="bg1">
+                  <a:lumMod val="50000"/>
+                </a:schemeClr>
+              </a:buClr>
+              <a:buSzPct val="100000"/>
+            </a:pPr>
+            <a:r>
+              <a:rPr lang="en-US" sz="1600" dirty="0">
+                <a:latin typeface="Helvetica Neue" panose="02000503000000020004" pitchFamily="2" charset="0"/>
+                <a:ea typeface="Helvetica Neue" panose="02000503000000020004" pitchFamily="2" charset="0"/>
+                <a:cs typeface="Helvetica Neue" panose="02000503000000020004" pitchFamily="2" charset="0"/>
+              </a:rPr>
+              <a:t>Information cannot be destroyed in quantum theory. ”Black hole information paradox”</a:t>
+            </a:r>
+          </a:p>
+        </p:txBody>
+      </p:sp>
     </p:spTree>
     <p:extLst>
       <p:ext uri="{BB962C8B-B14F-4D97-AF65-F5344CB8AC3E}">
-        <p14:creationId xmlns:p14="http://schemas.microsoft.com/office/powerpoint/2010/main" val="1196489999"/>
+        <p14:creationId xmlns:p14="http://schemas.microsoft.com/office/powerpoint/2010/main" val="550749066"/>
       </p:ext>
     </p:extLst>
   </p:cSld>
   <p:clrMapOvr>
     <a:masterClrMapping/>
   </p:clrMapOvr>
+  <p:timing>
+    <p:tnLst>
+      <p:par>
+        <p:cTn id="1" dur="indefinite" restart="never" nodeType="tmRoot">
+          <p:childTnLst>
+            <p:seq concurrent="1" nextAc="seek">
+              <p:cTn id="2" dur="indefinite" nodeType="mainSeq">
+                <p:childTnLst>
+                  <p:par>
+                    <p:cTn id="3" fill="hold">
+                      <p:stCondLst>
+                        <p:cond delay="indefinite"/>
+                      </p:stCondLst>
+                      <p:childTnLst>
+                        <p:par>
+                          <p:cTn id="4" fill="hold">
+                            <p:stCondLst>
+                              <p:cond delay="0"/>
+                            </p:stCondLst>
+                            <p:childTnLst>
+                              <p:par>
+                                <p:cTn id="5" presetID="1" presetClass="entr" presetSubtype="0" fill="hold" nodeType="clickEffect">
+                                  <p:stCondLst>
+                                    <p:cond delay="0"/>
+                                  </p:stCondLst>
+                                  <p:childTnLst>
+                                    <p:set>
+                                      <p:cBhvr>
+                                        <p:cTn id="6" dur="1" fill="hold">
+                                          <p:stCondLst>
+                                            <p:cond delay="0"/>
+                                          </p:stCondLst>
+                                        </p:cTn>
+                                        <p:tgtEl>
+                                          <p:spTgt spid="3076"/>
+                                        </p:tgtEl>
+                                        <p:attrNameLst>
+                                          <p:attrName>style.visibility</p:attrName>
+                                        </p:attrNameLst>
+                                      </p:cBhvr>
+                                      <p:to>
+                                        <p:strVal val="visible"/>
+                                      </p:to>
+                                    </p:set>
+                                  </p:childTnLst>
+                                </p:cTn>
+                              </p:par>
+                            </p:childTnLst>
+                          </p:cTn>
+                        </p:par>
+                      </p:childTnLst>
+                    </p:cTn>
+                  </p:par>
+                  <p:par>
+                    <p:cTn id="7" fill="hold">
+                      <p:stCondLst>
+                        <p:cond delay="indefinite"/>
+                      </p:stCondLst>
+                      <p:childTnLst>
+                        <p:par>
+                          <p:cTn id="8" fill="hold">
+                            <p:stCondLst>
+                              <p:cond delay="0"/>
+                            </p:stCondLst>
+                            <p:childTnLst>
+                              <p:par>
+                                <p:cTn id="9" presetID="1" presetClass="entr" presetSubtype="0" fill="hold" grpId="0" nodeType="clickEffect">
+                                  <p:stCondLst>
+                                    <p:cond delay="0"/>
+                                  </p:stCondLst>
+                                  <p:childTnLst>
+                                    <p:set>
+                                      <p:cBhvr>
+                                        <p:cTn id="10" dur="1" fill="hold">
+                                          <p:stCondLst>
+                                            <p:cond delay="0"/>
+                                          </p:stCondLst>
+                                        </p:cTn>
+                                        <p:tgtEl>
+                                          <p:spTgt spid="6"/>
+                                        </p:tgtEl>
+                                        <p:attrNameLst>
+                                          <p:attrName>style.visibility</p:attrName>
+                                        </p:attrNameLst>
+                                      </p:cBhvr>
+                                      <p:to>
+                                        <p:strVal val="visible"/>
+                                      </p:to>
+                                    </p:set>
+                                  </p:childTnLst>
+                                </p:cTn>
+                              </p:par>
+                            </p:childTnLst>
+                          </p:cTn>
+                        </p:par>
+                      </p:childTnLst>
+                    </p:cTn>
+                  </p:par>
+                </p:childTnLst>
+              </p:cTn>
+              <p:prevCondLst>
+                <p:cond evt="onPrev" delay="0">
+                  <p:tgtEl>
+                    <p:sldTgt/>
+                  </p:tgtEl>
+                </p:cond>
+              </p:prevCondLst>
+              <p:nextCondLst>
+                <p:cond evt="onNext" delay="0">
+                  <p:tgtEl>
+                    <p:sldTgt/>
+                  </p:tgtEl>
+                </p:cond>
+              </p:nextCondLst>
+            </p:seq>
+          </p:childTnLst>
+        </p:cTn>
+      </p:par>
+    </p:tnLst>
+    <p:bldLst>
+      <p:bldP spid="6" grpId="0"/>
+    </p:bldLst>
+  </p:timing>
 </p:sld>
 </file>
 
-<file path=ppt/slides/slide3.xml><?xml version="1.0" encoding="utf-8"?>
+<file path=ppt/slides/slide27.xml><?xml version="1.0" encoding="utf-8"?>
 <p:sld xmlns:a="http://schemas.openxmlformats.org/drawingml/2006/main" xmlns:r="http://schemas.openxmlformats.org/officeDocument/2006/relationships" xmlns:p="http://schemas.openxmlformats.org/presentationml/2006/main">
   <p:cSld>
     <p:spTree>
@@ -20697,7 +22175,7 @@
               </a:spcAft>
             </a:pPr>
             <a:r>
-              <a:rPr lang="en-US" b="1" dirty="0">
+              <a:rPr lang="en-US" sz="3600" b="1" dirty="0">
                 <a:solidFill>
                   <a:schemeClr val="tx1">
                     <a:lumMod val="65000"/>
@@ -20706,7 +22184,1217 @@
                 </a:solidFill>
                 <a:latin typeface="Garamond" panose="02020404030301010803" pitchFamily="18" charset="0"/>
               </a:rPr>
-              <a:t>Open questions from last week 2</a:t>
+              <a:t>Game time!</a:t>
+            </a:r>
+          </a:p>
+        </p:txBody>
+      </p:sp>
+      <p:sp>
+        <p:nvSpPr>
+          <p:cNvPr id="2" name="Slide Number Placeholder 1">
+            <a:extLst>
+              <a:ext uri="{FF2B5EF4-FFF2-40B4-BE49-F238E27FC236}">
+                <a16:creationId xmlns:a16="http://schemas.microsoft.com/office/drawing/2014/main" id="{A67DA90B-656D-8349-8950-078AABAE1757}"/>
+              </a:ext>
+            </a:extLst>
+          </p:cNvPr>
+          <p:cNvSpPr>
+            <a:spLocks noGrp="1"/>
+          </p:cNvSpPr>
+          <p:nvPr>
+            <p:ph type="sldNum" sz="quarter" idx="12"/>
+          </p:nvPr>
+        </p:nvSpPr>
+        <p:spPr/>
+        <p:txBody>
+          <a:bodyPr/>
+          <a:lstStyle/>
+          <a:p>
+            <a:fld id="{1D3114E9-4222-4A72-8713-D3519DB6E1E0}" type="slidenum">
+              <a:rPr lang="en-US" smtClean="0">
+                <a:solidFill>
+                  <a:prstClr val="black">
+                    <a:tint val="75000"/>
+                  </a:prstClr>
+                </a:solidFill>
+              </a:rPr>
+              <a:pPr/>
+              <a:t>27</a:t>
+            </a:fld>
+            <a:endParaRPr lang="en-US">
+              <a:solidFill>
+                <a:prstClr val="black">
+                  <a:tint val="75000"/>
+                </a:prstClr>
+              </a:solidFill>
+            </a:endParaRPr>
+          </a:p>
+        </p:txBody>
+      </p:sp>
+      <p:sp>
+        <p:nvSpPr>
+          <p:cNvPr id="12" name="TextBox 11">
+            <a:extLst>
+              <a:ext uri="{FF2B5EF4-FFF2-40B4-BE49-F238E27FC236}">
+                <a16:creationId xmlns:a16="http://schemas.microsoft.com/office/drawing/2014/main" id="{931F3E11-7241-F347-AB33-31328AFAF7D0}"/>
+              </a:ext>
+            </a:extLst>
+          </p:cNvPr>
+          <p:cNvSpPr txBox="1"/>
+          <p:nvPr/>
+        </p:nvSpPr>
+        <p:spPr>
+          <a:xfrm>
+            <a:off x="112887" y="6538912"/>
+            <a:ext cx="7981245" cy="270796"/>
+          </a:xfrm>
+          <a:prstGeom prst="rect">
+            <a:avLst/>
+          </a:prstGeom>
+          <a:noFill/>
+          <a:ln w="12700">
+            <a:noFill/>
+          </a:ln>
+        </p:spPr>
+        <p:txBody>
+          <a:bodyPr vert="horz" wrap="square" lIns="91440" tIns="45720" rIns="91440" bIns="45720" rtlCol="0">
+            <a:noAutofit/>
+          </a:bodyPr>
+          <a:lstStyle/>
+          <a:p>
+            <a:pPr fontAlgn="auto">
+              <a:spcBef>
+                <a:spcPts val="0"/>
+              </a:spcBef>
+              <a:spcAft>
+                <a:spcPts val="600"/>
+              </a:spcAft>
+              <a:buClr>
+                <a:srgbClr val="0070C0"/>
+              </a:buClr>
+              <a:buSzPct val="100000"/>
+            </a:pPr>
+            <a:r>
+              <a:rPr lang="en-US" sz="800" dirty="0">
+                <a:solidFill>
+                  <a:prstClr val="black"/>
+                </a:solidFill>
+                <a:latin typeface="Helvetica Neue" panose="02000503000000020004" pitchFamily="2" charset="0"/>
+                <a:ea typeface="Helvetica Neue" panose="02000503000000020004" pitchFamily="2" charset="0"/>
+                <a:cs typeface="Helvetica Neue" panose="02000503000000020004" pitchFamily="2" charset="0"/>
+              </a:rPr>
+              <a:t>https://</a:t>
+            </a:r>
+            <a:r>
+              <a:rPr lang="en-US" sz="800" dirty="0" err="1">
+                <a:solidFill>
+                  <a:prstClr val="black"/>
+                </a:solidFill>
+                <a:latin typeface="Helvetica Neue" panose="02000503000000020004" pitchFamily="2" charset="0"/>
+                <a:ea typeface="Helvetica Neue" panose="02000503000000020004" pitchFamily="2" charset="0"/>
+                <a:cs typeface="Helvetica Neue" panose="02000503000000020004" pitchFamily="2" charset="0"/>
+              </a:rPr>
+              <a:t>www.sciencenews.org</a:t>
+            </a:r>
+            <a:r>
+              <a:rPr lang="en-US" sz="800" dirty="0">
+                <a:solidFill>
+                  <a:prstClr val="black"/>
+                </a:solidFill>
+                <a:latin typeface="Helvetica Neue" panose="02000503000000020004" pitchFamily="2" charset="0"/>
+                <a:ea typeface="Helvetica Neue" panose="02000503000000020004" pitchFamily="2" charset="0"/>
+                <a:cs typeface="Helvetica Neue" panose="02000503000000020004" pitchFamily="2" charset="0"/>
+              </a:rPr>
+              <a:t>/wp-content/uploads/2018/05/050718_EC_numbers_feat.jpg, https://</a:t>
+            </a:r>
+            <a:r>
+              <a:rPr lang="en-US" sz="800" dirty="0" err="1">
+                <a:solidFill>
+                  <a:prstClr val="black"/>
+                </a:solidFill>
+                <a:latin typeface="Helvetica Neue" panose="02000503000000020004" pitchFamily="2" charset="0"/>
+                <a:ea typeface="Helvetica Neue" panose="02000503000000020004" pitchFamily="2" charset="0"/>
+                <a:cs typeface="Helvetica Neue" panose="02000503000000020004" pitchFamily="2" charset="0"/>
+              </a:rPr>
+              <a:t>www.phillyvoice.com</a:t>
+            </a:r>
+            <a:r>
+              <a:rPr lang="en-US" sz="800" dirty="0">
+                <a:solidFill>
+                  <a:prstClr val="black"/>
+                </a:solidFill>
+                <a:latin typeface="Helvetica Neue" panose="02000503000000020004" pitchFamily="2" charset="0"/>
+                <a:ea typeface="Helvetica Neue" panose="02000503000000020004" pitchFamily="2" charset="0"/>
+                <a:cs typeface="Helvetica Neue" panose="02000503000000020004" pitchFamily="2" charset="0"/>
+              </a:rPr>
+              <a:t>/wordle-strategies-how-to-play/</a:t>
+            </a:r>
+          </a:p>
+        </p:txBody>
+      </p:sp>
+      <p:sp>
+        <p:nvSpPr>
+          <p:cNvPr id="13" name="TextBox 12">
+            <a:extLst>
+              <a:ext uri="{FF2B5EF4-FFF2-40B4-BE49-F238E27FC236}">
+                <a16:creationId xmlns:a16="http://schemas.microsoft.com/office/drawing/2014/main" id="{FC7A2621-6545-7C4B-BB34-7E4C4B886EEE}"/>
+              </a:ext>
+            </a:extLst>
+          </p:cNvPr>
+          <p:cNvSpPr txBox="1"/>
+          <p:nvPr/>
+        </p:nvSpPr>
+        <p:spPr>
+          <a:xfrm>
+            <a:off x="304800" y="4328611"/>
+            <a:ext cx="8534400" cy="1939506"/>
+          </a:xfrm>
+          <a:prstGeom prst="rect">
+            <a:avLst/>
+          </a:prstGeom>
+          <a:noFill/>
+          <a:ln w="12700">
+            <a:noFill/>
+          </a:ln>
+        </p:spPr>
+        <p:txBody>
+          <a:bodyPr vert="horz" wrap="square" lIns="91440" tIns="45720" rIns="91440" bIns="45720" rtlCol="0">
+            <a:noAutofit/>
+          </a:bodyPr>
+          <a:lstStyle/>
+          <a:p>
+            <a:pPr marL="342900" indent="-342900" fontAlgn="auto">
+              <a:spcBef>
+                <a:spcPts val="0"/>
+              </a:spcBef>
+              <a:spcAft>
+                <a:spcPts val="0"/>
+              </a:spcAft>
+              <a:buClr>
+                <a:schemeClr val="bg1">
+                  <a:lumMod val="50000"/>
+                </a:schemeClr>
+              </a:buClr>
+              <a:buSzPct val="100000"/>
+              <a:buFont typeface="Arial" panose="020B0604020202020204" pitchFamily="34" charset="0"/>
+              <a:buChar char="•"/>
+            </a:pPr>
+            <a:r>
+              <a:rPr lang="en-US" sz="2800" dirty="0">
+                <a:latin typeface="Helvetica Neue" panose="02000503000000020004" pitchFamily="2" charset="0"/>
+                <a:ea typeface="Helvetica Neue" panose="02000503000000020004" pitchFamily="2" charset="0"/>
+                <a:cs typeface="Helvetica Neue" panose="02000503000000020004" pitchFamily="2" charset="0"/>
+              </a:rPr>
+              <a:t>Two teams</a:t>
+            </a:r>
+          </a:p>
+          <a:p>
+            <a:pPr fontAlgn="auto">
+              <a:spcBef>
+                <a:spcPts val="0"/>
+              </a:spcBef>
+              <a:spcAft>
+                <a:spcPts val="0"/>
+              </a:spcAft>
+              <a:buClr>
+                <a:schemeClr val="bg1">
+                  <a:lumMod val="50000"/>
+                </a:schemeClr>
+              </a:buClr>
+              <a:buSzPct val="100000"/>
+            </a:pPr>
+            <a:endParaRPr lang="en-US" sz="2800" dirty="0">
+              <a:latin typeface="Helvetica Neue" panose="02000503000000020004" pitchFamily="2" charset="0"/>
+              <a:ea typeface="Helvetica Neue" panose="02000503000000020004" pitchFamily="2" charset="0"/>
+              <a:cs typeface="Helvetica Neue" panose="02000503000000020004" pitchFamily="2" charset="0"/>
+            </a:endParaRPr>
+          </a:p>
+          <a:p>
+            <a:pPr marL="342900" indent="-342900" fontAlgn="auto">
+              <a:spcBef>
+                <a:spcPts val="0"/>
+              </a:spcBef>
+              <a:spcAft>
+                <a:spcPts val="0"/>
+              </a:spcAft>
+              <a:buClr>
+                <a:schemeClr val="bg1">
+                  <a:lumMod val="50000"/>
+                </a:schemeClr>
+              </a:buClr>
+              <a:buSzPct val="100000"/>
+              <a:buFont typeface="Arial" panose="020B0604020202020204" pitchFamily="34" charset="0"/>
+              <a:buChar char="•"/>
+            </a:pPr>
+            <a:r>
+              <a:rPr lang="en-US" sz="2800" dirty="0">
+                <a:latin typeface="Helvetica Neue" panose="02000503000000020004" pitchFamily="2" charset="0"/>
+                <a:ea typeface="Helvetica Neue" panose="02000503000000020004" pitchFamily="2" charset="0"/>
+                <a:cs typeface="Helvetica Neue" panose="02000503000000020004" pitchFamily="2" charset="0"/>
+              </a:rPr>
+              <a:t>Phones/computers away</a:t>
+            </a:r>
+          </a:p>
+        </p:txBody>
+      </p:sp>
+      <p:pic>
+        <p:nvPicPr>
+          <p:cNvPr id="19458" name="Picture 2" descr="Real numbers don't cut it in the real world, this physicist argues |  Science News">
+            <a:extLst>
+              <a:ext uri="{FF2B5EF4-FFF2-40B4-BE49-F238E27FC236}">
+                <a16:creationId xmlns:a16="http://schemas.microsoft.com/office/drawing/2014/main" id="{F830BFA6-188A-6F43-9F8A-27F0230B2119}"/>
+              </a:ext>
+            </a:extLst>
+          </p:cNvPr>
+          <p:cNvPicPr>
+            <a:picLocks noChangeAspect="1" noChangeArrowheads="1"/>
+          </p:cNvPicPr>
+          <p:nvPr/>
+        </p:nvPicPr>
+        <p:blipFill>
+          <a:blip r:embed="rId2">
+            <a:extLst>
+              <a:ext uri="{28A0092B-C50C-407E-A947-70E740481C1C}">
+                <a14:useLocalDpi xmlns:a14="http://schemas.microsoft.com/office/drawing/2010/main" val="0"/>
+              </a:ext>
+            </a:extLst>
+          </a:blip>
+          <a:srcRect/>
+          <a:stretch>
+            <a:fillRect/>
+          </a:stretch>
+        </p:blipFill>
+        <p:spPr bwMode="auto">
+          <a:xfrm>
+            <a:off x="673100" y="1703810"/>
+            <a:ext cx="3898900" cy="2082800"/>
+          </a:xfrm>
+          <a:prstGeom prst="rect">
+            <a:avLst/>
+          </a:prstGeom>
+          <a:noFill/>
+          <a:extLst>
+            <a:ext uri="{909E8E84-426E-40DD-AFC4-6F175D3DCCD1}">
+              <a14:hiddenFill xmlns:a14="http://schemas.microsoft.com/office/drawing/2010/main">
+                <a:solidFill>
+                  <a:srgbClr val="FFFFFF"/>
+                </a:solidFill>
+              </a14:hiddenFill>
+            </a:ext>
+          </a:extLst>
+        </p:spPr>
+      </p:pic>
+      <p:pic>
+        <p:nvPicPr>
+          <p:cNvPr id="4098" name="Picture 2" descr="How to play Wordle: Strategies for beating the viral word game | PhillyVoice">
+            <a:extLst>
+              <a:ext uri="{FF2B5EF4-FFF2-40B4-BE49-F238E27FC236}">
+                <a16:creationId xmlns:a16="http://schemas.microsoft.com/office/drawing/2014/main" id="{F02B2E3D-25FC-0C96-A3BD-2686131BB062}"/>
+              </a:ext>
+            </a:extLst>
+          </p:cNvPr>
+          <p:cNvPicPr>
+            <a:picLocks noChangeAspect="1" noChangeArrowheads="1"/>
+          </p:cNvPicPr>
+          <p:nvPr/>
+        </p:nvPicPr>
+        <p:blipFill>
+          <a:blip r:embed="rId3">
+            <a:extLst>
+              <a:ext uri="{28A0092B-C50C-407E-A947-70E740481C1C}">
+                <a14:useLocalDpi xmlns:a14="http://schemas.microsoft.com/office/drawing/2010/main" val="0"/>
+              </a:ext>
+            </a:extLst>
+          </a:blip>
+          <a:srcRect/>
+          <a:stretch>
+            <a:fillRect/>
+          </a:stretch>
+        </p:blipFill>
+        <p:spPr bwMode="auto">
+          <a:xfrm>
+            <a:off x="4944242" y="1452209"/>
+            <a:ext cx="3821386" cy="2545684"/>
+          </a:xfrm>
+          <a:prstGeom prst="rect">
+            <a:avLst/>
+          </a:prstGeom>
+          <a:noFill/>
+          <a:extLst>
+            <a:ext uri="{909E8E84-426E-40DD-AFC4-6F175D3DCCD1}">
+              <a14:hiddenFill xmlns:a14="http://schemas.microsoft.com/office/drawing/2010/main">
+                <a:solidFill>
+                  <a:srgbClr val="FFFFFF"/>
+                </a:solidFill>
+              </a14:hiddenFill>
+            </a:ext>
+          </a:extLst>
+        </p:spPr>
+      </p:pic>
+    </p:spTree>
+    <p:extLst>
+      <p:ext uri="{BB962C8B-B14F-4D97-AF65-F5344CB8AC3E}">
+        <p14:creationId xmlns:p14="http://schemas.microsoft.com/office/powerpoint/2010/main" val="3016208406"/>
+      </p:ext>
+    </p:extLst>
+  </p:cSld>
+  <p:clrMapOvr>
+    <a:masterClrMapping/>
+  </p:clrMapOvr>
+</p:sld>
+</file>
+
+<file path=ppt/slides/slide28.xml><?xml version="1.0" encoding="utf-8"?>
+<p:sld xmlns:a="http://schemas.openxmlformats.org/drawingml/2006/main" xmlns:r="http://schemas.openxmlformats.org/officeDocument/2006/relationships" xmlns:p="http://schemas.openxmlformats.org/presentationml/2006/main">
+  <p:cSld>
+    <p:spTree>
+      <p:nvGrpSpPr>
+        <p:cNvPr id="1" name=""/>
+        <p:cNvGrpSpPr/>
+        <p:nvPr/>
+      </p:nvGrpSpPr>
+      <p:grpSpPr>
+        <a:xfrm>
+          <a:off x="0" y="0"/>
+          <a:ext cx="0" cy="0"/>
+          <a:chOff x="0" y="0"/>
+          <a:chExt cx="0" cy="0"/>
+        </a:xfrm>
+      </p:grpSpPr>
+      <p:sp>
+        <p:nvSpPr>
+          <p:cNvPr id="4" name="Title 1"/>
+          <p:cNvSpPr txBox="1">
+            <a:spLocks/>
+          </p:cNvSpPr>
+          <p:nvPr/>
+        </p:nvSpPr>
+        <p:spPr>
+          <a:xfrm>
+            <a:off x="0" y="41589"/>
+            <a:ext cx="9144000" cy="1139825"/>
+          </a:xfrm>
+          <a:prstGeom prst="rect">
+            <a:avLst/>
+          </a:prstGeom>
+        </p:spPr>
+        <p:txBody>
+          <a:bodyPr vert="horz" lIns="91440" tIns="45720" rIns="91440" bIns="45720" rtlCol="0" anchor="ctr">
+            <a:normAutofit/>
+          </a:bodyPr>
+          <a:lstStyle>
+            <a:lvl1pPr algn="ctr" defTabSz="914400" rtl="0" eaLnBrk="1" latinLnBrk="0" hangingPunct="1">
+              <a:spcBef>
+                <a:spcPct val="0"/>
+              </a:spcBef>
+              <a:buNone/>
+              <a:defRPr sz="4400" kern="1200">
+                <a:solidFill>
+                  <a:schemeClr val="tx1"/>
+                </a:solidFill>
+                <a:latin typeface="+mj-lt"/>
+                <a:ea typeface="+mj-ea"/>
+                <a:cs typeface="+mj-cs"/>
+              </a:defRPr>
+            </a:lvl1pPr>
+          </a:lstStyle>
+          <a:p>
+            <a:pPr fontAlgn="auto">
+              <a:spcAft>
+                <a:spcPts val="0"/>
+              </a:spcAft>
+            </a:pPr>
+            <a:r>
+              <a:rPr lang="en-US" sz="3600" b="1" dirty="0">
+                <a:solidFill>
+                  <a:schemeClr val="tx1">
+                    <a:lumMod val="65000"/>
+                    <a:lumOff val="35000"/>
+                  </a:schemeClr>
+                </a:solidFill>
+                <a:latin typeface="Garamond" panose="02020404030301010803" pitchFamily="18" charset="0"/>
+              </a:rPr>
+              <a:t>Game 1: Guess that number!</a:t>
+            </a:r>
+          </a:p>
+        </p:txBody>
+      </p:sp>
+      <p:sp>
+        <p:nvSpPr>
+          <p:cNvPr id="2" name="Slide Number Placeholder 1">
+            <a:extLst>
+              <a:ext uri="{FF2B5EF4-FFF2-40B4-BE49-F238E27FC236}">
+                <a16:creationId xmlns:a16="http://schemas.microsoft.com/office/drawing/2014/main" id="{A67DA90B-656D-8349-8950-078AABAE1757}"/>
+              </a:ext>
+            </a:extLst>
+          </p:cNvPr>
+          <p:cNvSpPr>
+            <a:spLocks noGrp="1"/>
+          </p:cNvSpPr>
+          <p:nvPr>
+            <p:ph type="sldNum" sz="quarter" idx="12"/>
+          </p:nvPr>
+        </p:nvSpPr>
+        <p:spPr/>
+        <p:txBody>
+          <a:bodyPr/>
+          <a:lstStyle/>
+          <a:p>
+            <a:fld id="{1D3114E9-4222-4A72-8713-D3519DB6E1E0}" type="slidenum">
+              <a:rPr lang="en-US" smtClean="0">
+                <a:solidFill>
+                  <a:prstClr val="black">
+                    <a:tint val="75000"/>
+                  </a:prstClr>
+                </a:solidFill>
+              </a:rPr>
+              <a:pPr/>
+              <a:t>28</a:t>
+            </a:fld>
+            <a:endParaRPr lang="en-US">
+              <a:solidFill>
+                <a:prstClr val="black">
+                  <a:tint val="75000"/>
+                </a:prstClr>
+              </a:solidFill>
+            </a:endParaRPr>
+          </a:p>
+        </p:txBody>
+      </p:sp>
+      <p:pic>
+        <p:nvPicPr>
+          <p:cNvPr id="8" name="Picture 2" descr="Real numbers don't cut it in the real world, this physicist argues |  Science News">
+            <a:extLst>
+              <a:ext uri="{FF2B5EF4-FFF2-40B4-BE49-F238E27FC236}">
+                <a16:creationId xmlns:a16="http://schemas.microsoft.com/office/drawing/2014/main" id="{A037EEFC-220A-FC47-83D8-072E9AEF71B7}"/>
+              </a:ext>
+            </a:extLst>
+          </p:cNvPr>
+          <p:cNvPicPr>
+            <a:picLocks noChangeAspect="1" noChangeArrowheads="1"/>
+          </p:cNvPicPr>
+          <p:nvPr/>
+        </p:nvPicPr>
+        <p:blipFill>
+          <a:blip r:embed="rId2">
+            <a:extLst>
+              <a:ext uri="{28A0092B-C50C-407E-A947-70E740481C1C}">
+                <a14:useLocalDpi xmlns:a14="http://schemas.microsoft.com/office/drawing/2010/main" val="0"/>
+              </a:ext>
+            </a:extLst>
+          </a:blip>
+          <a:srcRect/>
+          <a:stretch>
+            <a:fillRect/>
+          </a:stretch>
+        </p:blipFill>
+        <p:spPr bwMode="auto">
+          <a:xfrm>
+            <a:off x="2622550" y="1346200"/>
+            <a:ext cx="3898900" cy="2082800"/>
+          </a:xfrm>
+          <a:prstGeom prst="rect">
+            <a:avLst/>
+          </a:prstGeom>
+          <a:noFill/>
+          <a:extLst>
+            <a:ext uri="{909E8E84-426E-40DD-AFC4-6F175D3DCCD1}">
+              <a14:hiddenFill xmlns:a14="http://schemas.microsoft.com/office/drawing/2010/main">
+                <a:solidFill>
+                  <a:srgbClr val="FFFFFF"/>
+                </a:solidFill>
+              </a14:hiddenFill>
+            </a:ext>
+          </a:extLst>
+        </p:spPr>
+      </p:pic>
+      <p:sp>
+        <p:nvSpPr>
+          <p:cNvPr id="9" name="TextBox 8">
+            <a:extLst>
+              <a:ext uri="{FF2B5EF4-FFF2-40B4-BE49-F238E27FC236}">
+                <a16:creationId xmlns:a16="http://schemas.microsoft.com/office/drawing/2014/main" id="{3DE81A93-0D65-7042-97C9-B64E2BB1820C}"/>
+              </a:ext>
+            </a:extLst>
+          </p:cNvPr>
+          <p:cNvSpPr txBox="1"/>
+          <p:nvPr/>
+        </p:nvSpPr>
+        <p:spPr>
+          <a:xfrm>
+            <a:off x="255181" y="4076376"/>
+            <a:ext cx="8686800" cy="2279974"/>
+          </a:xfrm>
+          <a:prstGeom prst="rect">
+            <a:avLst/>
+          </a:prstGeom>
+          <a:noFill/>
+          <a:ln w="12700">
+            <a:noFill/>
+          </a:ln>
+        </p:spPr>
+        <p:txBody>
+          <a:bodyPr vert="horz" wrap="square" lIns="91440" tIns="45720" rIns="91440" bIns="45720" rtlCol="0">
+            <a:noAutofit/>
+          </a:bodyPr>
+          <a:lstStyle/>
+          <a:p>
+            <a:pPr marL="457200" indent="-457200" fontAlgn="auto">
+              <a:spcBef>
+                <a:spcPts val="0"/>
+              </a:spcBef>
+              <a:spcAft>
+                <a:spcPts val="1200"/>
+              </a:spcAft>
+              <a:buClr>
+                <a:schemeClr val="bg1">
+                  <a:lumMod val="50000"/>
+                </a:schemeClr>
+              </a:buClr>
+              <a:buSzPct val="100000"/>
+              <a:buFont typeface="Arial" panose="020B0604020202020204" pitchFamily="34" charset="0"/>
+              <a:buChar char="•"/>
+            </a:pPr>
+            <a:r>
+              <a:rPr lang="en-US" sz="3200" i="1" dirty="0">
+                <a:latin typeface="Helvetica Neue" panose="02000503000000020004" pitchFamily="2" charset="0"/>
+                <a:ea typeface="Helvetica Neue" panose="02000503000000020004" pitchFamily="2" charset="0"/>
+                <a:cs typeface="Helvetica Neue" panose="02000503000000020004" pitchFamily="2" charset="0"/>
+              </a:rPr>
+              <a:t>N </a:t>
+            </a:r>
+            <a:r>
+              <a:rPr lang="en-US" sz="3200" dirty="0">
+                <a:latin typeface="Helvetica Neue" panose="02000503000000020004" pitchFamily="2" charset="0"/>
+                <a:ea typeface="Helvetica Neue" panose="02000503000000020004" pitchFamily="2" charset="0"/>
+                <a:cs typeface="Helvetica Neue" panose="02000503000000020004" pitchFamily="2" charset="0"/>
+              </a:rPr>
+              <a:t>= </a:t>
+            </a:r>
+            <a:r>
+              <a:rPr lang="en-US" sz="3200" dirty="0" err="1">
+                <a:latin typeface="Helvetica Neue" panose="02000503000000020004" pitchFamily="2" charset="0"/>
+                <a:ea typeface="Helvetica Neue" panose="02000503000000020004" pitchFamily="2" charset="0"/>
+                <a:cs typeface="Helvetica Neue" panose="02000503000000020004" pitchFamily="2" charset="0"/>
+              </a:rPr>
+              <a:t>randint</a:t>
+            </a:r>
+            <a:r>
+              <a:rPr lang="en-US" sz="3200" dirty="0">
+                <a:latin typeface="Helvetica Neue" panose="02000503000000020004" pitchFamily="2" charset="0"/>
+                <a:ea typeface="Helvetica Neue" panose="02000503000000020004" pitchFamily="2" charset="0"/>
+                <a:cs typeface="Helvetica Neue" panose="02000503000000020004" pitchFamily="2" charset="0"/>
+              </a:rPr>
+              <a:t>(1,100)</a:t>
+            </a:r>
+          </a:p>
+          <a:p>
+            <a:pPr marL="457200" indent="-457200" fontAlgn="auto">
+              <a:spcBef>
+                <a:spcPts val="0"/>
+              </a:spcBef>
+              <a:spcAft>
+                <a:spcPts val="1200"/>
+              </a:spcAft>
+              <a:buClr>
+                <a:schemeClr val="bg1">
+                  <a:lumMod val="50000"/>
+                </a:schemeClr>
+              </a:buClr>
+              <a:buSzPct val="100000"/>
+              <a:buFont typeface="Arial" panose="020B0604020202020204" pitchFamily="34" charset="0"/>
+              <a:buChar char="•"/>
+            </a:pPr>
+            <a:r>
+              <a:rPr lang="en-US" sz="3200" dirty="0">
+                <a:latin typeface="Helvetica Neue" panose="02000503000000020004" pitchFamily="2" charset="0"/>
+                <a:ea typeface="Helvetica Neue" panose="02000503000000020004" pitchFamily="2" charset="0"/>
+                <a:cs typeface="Helvetica Neue" panose="02000503000000020004" pitchFamily="2" charset="0"/>
+              </a:rPr>
+              <a:t>Your guess: a integer between 1–100</a:t>
+            </a:r>
+          </a:p>
+          <a:p>
+            <a:pPr marL="457200" indent="-457200" fontAlgn="auto">
+              <a:spcBef>
+                <a:spcPts val="0"/>
+              </a:spcBef>
+              <a:spcAft>
+                <a:spcPts val="1200"/>
+              </a:spcAft>
+              <a:buClr>
+                <a:schemeClr val="bg1">
+                  <a:lumMod val="50000"/>
+                </a:schemeClr>
+              </a:buClr>
+              <a:buSzPct val="100000"/>
+              <a:buFont typeface="Arial" panose="020B0604020202020204" pitchFamily="34" charset="0"/>
+              <a:buChar char="•"/>
+            </a:pPr>
+            <a:r>
+              <a:rPr lang="en-US" sz="3200" dirty="0">
+                <a:latin typeface="Helvetica Neue" panose="02000503000000020004" pitchFamily="2" charset="0"/>
+                <a:ea typeface="Helvetica Neue" panose="02000503000000020004" pitchFamily="2" charset="0"/>
+                <a:cs typeface="Helvetica Neue" panose="02000503000000020004" pitchFamily="2" charset="0"/>
+              </a:rPr>
+              <a:t>The reveal: “Match” OR “higher” OR “lower”</a:t>
+            </a:r>
+          </a:p>
+          <a:p>
+            <a:pPr marL="457200" indent="-457200" fontAlgn="auto">
+              <a:spcBef>
+                <a:spcPts val="0"/>
+              </a:spcBef>
+              <a:spcAft>
+                <a:spcPts val="1200"/>
+              </a:spcAft>
+              <a:buClr>
+                <a:schemeClr val="bg1">
+                  <a:lumMod val="50000"/>
+                </a:schemeClr>
+              </a:buClr>
+              <a:buSzPct val="100000"/>
+              <a:buFont typeface="Arial" panose="020B0604020202020204" pitchFamily="34" charset="0"/>
+              <a:buChar char="•"/>
+            </a:pPr>
+            <a:endParaRPr lang="en-US" sz="3200" dirty="0">
+              <a:latin typeface="Helvetica Neue" panose="02000503000000020004" pitchFamily="2" charset="0"/>
+              <a:ea typeface="Helvetica Neue" panose="02000503000000020004" pitchFamily="2" charset="0"/>
+              <a:cs typeface="Helvetica Neue" panose="02000503000000020004" pitchFamily="2" charset="0"/>
+            </a:endParaRPr>
+          </a:p>
+        </p:txBody>
+      </p:sp>
+    </p:spTree>
+    <p:extLst>
+      <p:ext uri="{BB962C8B-B14F-4D97-AF65-F5344CB8AC3E}">
+        <p14:creationId xmlns:p14="http://schemas.microsoft.com/office/powerpoint/2010/main" val="2335424729"/>
+      </p:ext>
+    </p:extLst>
+  </p:cSld>
+  <p:clrMapOvr>
+    <a:masterClrMapping/>
+  </p:clrMapOvr>
+</p:sld>
+</file>
+
+<file path=ppt/slides/slide29.xml><?xml version="1.0" encoding="utf-8"?>
+<p:sld xmlns:a="http://schemas.openxmlformats.org/drawingml/2006/main" xmlns:r="http://schemas.openxmlformats.org/officeDocument/2006/relationships" xmlns:p="http://schemas.openxmlformats.org/presentationml/2006/main">
+  <p:cSld>
+    <p:spTree>
+      <p:nvGrpSpPr>
+        <p:cNvPr id="1" name=""/>
+        <p:cNvGrpSpPr/>
+        <p:nvPr/>
+      </p:nvGrpSpPr>
+      <p:grpSpPr>
+        <a:xfrm>
+          <a:off x="0" y="0"/>
+          <a:ext cx="0" cy="0"/>
+          <a:chOff x="0" y="0"/>
+          <a:chExt cx="0" cy="0"/>
+        </a:xfrm>
+      </p:grpSpPr>
+      <p:sp>
+        <p:nvSpPr>
+          <p:cNvPr id="4" name="Title 1"/>
+          <p:cNvSpPr txBox="1">
+            <a:spLocks/>
+          </p:cNvSpPr>
+          <p:nvPr/>
+        </p:nvSpPr>
+        <p:spPr>
+          <a:xfrm>
+            <a:off x="0" y="41589"/>
+            <a:ext cx="9144000" cy="1139825"/>
+          </a:xfrm>
+          <a:prstGeom prst="rect">
+            <a:avLst/>
+          </a:prstGeom>
+        </p:spPr>
+        <p:txBody>
+          <a:bodyPr vert="horz" lIns="91440" tIns="45720" rIns="91440" bIns="45720" rtlCol="0" anchor="ctr">
+            <a:normAutofit/>
+          </a:bodyPr>
+          <a:lstStyle>
+            <a:lvl1pPr algn="ctr" defTabSz="914400" rtl="0" eaLnBrk="1" latinLnBrk="0" hangingPunct="1">
+              <a:spcBef>
+                <a:spcPct val="0"/>
+              </a:spcBef>
+              <a:buNone/>
+              <a:defRPr sz="4400" kern="1200">
+                <a:solidFill>
+                  <a:schemeClr val="tx1"/>
+                </a:solidFill>
+                <a:latin typeface="+mj-lt"/>
+                <a:ea typeface="+mj-ea"/>
+                <a:cs typeface="+mj-cs"/>
+              </a:defRPr>
+            </a:lvl1pPr>
+          </a:lstStyle>
+          <a:p>
+            <a:pPr fontAlgn="auto">
+              <a:spcAft>
+                <a:spcPts val="0"/>
+              </a:spcAft>
+            </a:pPr>
+            <a:r>
+              <a:rPr lang="en-US" sz="3600" b="1" dirty="0">
+                <a:solidFill>
+                  <a:schemeClr val="tx1">
+                    <a:lumMod val="65000"/>
+                    <a:lumOff val="35000"/>
+                  </a:schemeClr>
+                </a:solidFill>
+                <a:latin typeface="Garamond" panose="02020404030301010803" pitchFamily="18" charset="0"/>
+              </a:rPr>
+              <a:t>Game 2: Wordle!</a:t>
+            </a:r>
+          </a:p>
+        </p:txBody>
+      </p:sp>
+      <p:sp>
+        <p:nvSpPr>
+          <p:cNvPr id="2" name="Slide Number Placeholder 1">
+            <a:extLst>
+              <a:ext uri="{FF2B5EF4-FFF2-40B4-BE49-F238E27FC236}">
+                <a16:creationId xmlns:a16="http://schemas.microsoft.com/office/drawing/2014/main" id="{A67DA90B-656D-8349-8950-078AABAE1757}"/>
+              </a:ext>
+            </a:extLst>
+          </p:cNvPr>
+          <p:cNvSpPr>
+            <a:spLocks noGrp="1"/>
+          </p:cNvSpPr>
+          <p:nvPr>
+            <p:ph type="sldNum" sz="quarter" idx="12"/>
+          </p:nvPr>
+        </p:nvSpPr>
+        <p:spPr/>
+        <p:txBody>
+          <a:bodyPr/>
+          <a:lstStyle/>
+          <a:p>
+            <a:fld id="{1D3114E9-4222-4A72-8713-D3519DB6E1E0}" type="slidenum">
+              <a:rPr lang="en-US" smtClean="0">
+                <a:solidFill>
+                  <a:prstClr val="black">
+                    <a:tint val="75000"/>
+                  </a:prstClr>
+                </a:solidFill>
+              </a:rPr>
+              <a:pPr/>
+              <a:t>29</a:t>
+            </a:fld>
+            <a:endParaRPr lang="en-US">
+              <a:solidFill>
+                <a:prstClr val="black">
+                  <a:tint val="75000"/>
+                </a:prstClr>
+              </a:solidFill>
+            </a:endParaRPr>
+          </a:p>
+        </p:txBody>
+      </p:sp>
+      <p:pic>
+        <p:nvPicPr>
+          <p:cNvPr id="5" name="Picture 2" descr="How to play Wordle: Strategies for beating the viral word game | PhillyVoice">
+            <a:extLst>
+              <a:ext uri="{FF2B5EF4-FFF2-40B4-BE49-F238E27FC236}">
+                <a16:creationId xmlns:a16="http://schemas.microsoft.com/office/drawing/2014/main" id="{624B4DB4-A8C6-8BFD-F064-B2020FF24EC5}"/>
+              </a:ext>
+            </a:extLst>
+          </p:cNvPr>
+          <p:cNvPicPr>
+            <a:picLocks noChangeAspect="1" noChangeArrowheads="1"/>
+          </p:cNvPicPr>
+          <p:nvPr/>
+        </p:nvPicPr>
+        <p:blipFill>
+          <a:blip r:embed="rId2">
+            <a:extLst>
+              <a:ext uri="{28A0092B-C50C-407E-A947-70E740481C1C}">
+                <a14:useLocalDpi xmlns:a14="http://schemas.microsoft.com/office/drawing/2010/main" val="0"/>
+              </a:ext>
+            </a:extLst>
+          </a:blip>
+          <a:srcRect/>
+          <a:stretch>
+            <a:fillRect/>
+          </a:stretch>
+        </p:blipFill>
+        <p:spPr bwMode="auto">
+          <a:xfrm>
+            <a:off x="130502" y="1630883"/>
+            <a:ext cx="4825189" cy="3214385"/>
+          </a:xfrm>
+          <a:prstGeom prst="rect">
+            <a:avLst/>
+          </a:prstGeom>
+          <a:noFill/>
+          <a:extLst>
+            <a:ext uri="{909E8E84-426E-40DD-AFC4-6F175D3DCCD1}">
+              <a14:hiddenFill xmlns:a14="http://schemas.microsoft.com/office/drawing/2010/main">
+                <a:solidFill>
+                  <a:srgbClr val="FFFFFF"/>
+                </a:solidFill>
+              </a14:hiddenFill>
+            </a:ext>
+          </a:extLst>
+        </p:spPr>
+      </p:pic>
+      <p:pic>
+        <p:nvPicPr>
+          <p:cNvPr id="5124" name="Picture 4" descr="The Wild True Story Behind Samuel L. Jackson's Famous Jurassic Park Line">
+            <a:extLst>
+              <a:ext uri="{FF2B5EF4-FFF2-40B4-BE49-F238E27FC236}">
+                <a16:creationId xmlns:a16="http://schemas.microsoft.com/office/drawing/2014/main" id="{EE484300-CE64-524C-9B25-54C9B3C17A6C}"/>
+              </a:ext>
+            </a:extLst>
+          </p:cNvPr>
+          <p:cNvPicPr>
+            <a:picLocks noChangeAspect="1" noChangeArrowheads="1"/>
+          </p:cNvPicPr>
+          <p:nvPr/>
+        </p:nvPicPr>
+        <p:blipFill>
+          <a:blip r:embed="rId3">
+            <a:extLst>
+              <a:ext uri="{28A0092B-C50C-407E-A947-70E740481C1C}">
+                <a14:useLocalDpi xmlns:a14="http://schemas.microsoft.com/office/drawing/2010/main" val="0"/>
+              </a:ext>
+            </a:extLst>
+          </a:blip>
+          <a:srcRect/>
+          <a:stretch>
+            <a:fillRect/>
+          </a:stretch>
+        </p:blipFill>
+        <p:spPr bwMode="auto">
+          <a:xfrm>
+            <a:off x="4808881" y="2732689"/>
+            <a:ext cx="4089003" cy="2297934"/>
+          </a:xfrm>
+          <a:prstGeom prst="rect">
+            <a:avLst/>
+          </a:prstGeom>
+          <a:noFill/>
+          <a:extLst>
+            <a:ext uri="{909E8E84-426E-40DD-AFC4-6F175D3DCCD1}">
+              <a14:hiddenFill xmlns:a14="http://schemas.microsoft.com/office/drawing/2010/main">
+                <a:solidFill>
+                  <a:srgbClr val="FFFFFF"/>
+                </a:solidFill>
+              </a14:hiddenFill>
+            </a:ext>
+          </a:extLst>
+        </p:spPr>
+      </p:pic>
+      <p:sp>
+        <p:nvSpPr>
+          <p:cNvPr id="7" name="TextBox 6">
+            <a:extLst>
+              <a:ext uri="{FF2B5EF4-FFF2-40B4-BE49-F238E27FC236}">
+                <a16:creationId xmlns:a16="http://schemas.microsoft.com/office/drawing/2014/main" id="{ACA7F92E-62C7-22C9-B1A4-F4C62E133804}"/>
+              </a:ext>
+            </a:extLst>
+          </p:cNvPr>
+          <p:cNvSpPr txBox="1"/>
+          <p:nvPr/>
+        </p:nvSpPr>
+        <p:spPr>
+          <a:xfrm>
+            <a:off x="112887" y="6538912"/>
+            <a:ext cx="7981245" cy="270796"/>
+          </a:xfrm>
+          <a:prstGeom prst="rect">
+            <a:avLst/>
+          </a:prstGeom>
+          <a:noFill/>
+          <a:ln w="12700">
+            <a:noFill/>
+          </a:ln>
+        </p:spPr>
+        <p:txBody>
+          <a:bodyPr vert="horz" wrap="square" lIns="91440" tIns="45720" rIns="91440" bIns="45720" rtlCol="0">
+            <a:noAutofit/>
+          </a:bodyPr>
+          <a:lstStyle/>
+          <a:p>
+            <a:pPr fontAlgn="auto">
+              <a:spcBef>
+                <a:spcPts val="0"/>
+              </a:spcBef>
+              <a:spcAft>
+                <a:spcPts val="600"/>
+              </a:spcAft>
+              <a:buClr>
+                <a:srgbClr val="0070C0"/>
+              </a:buClr>
+              <a:buSzPct val="100000"/>
+            </a:pPr>
+            <a:r>
+              <a:rPr lang="en-US" sz="800" dirty="0">
+                <a:solidFill>
+                  <a:prstClr val="black"/>
+                </a:solidFill>
+                <a:latin typeface="Helvetica Neue" panose="02000503000000020004" pitchFamily="2" charset="0"/>
+                <a:ea typeface="Helvetica Neue" panose="02000503000000020004" pitchFamily="2" charset="0"/>
+                <a:cs typeface="Helvetica Neue" panose="02000503000000020004" pitchFamily="2" charset="0"/>
+              </a:rPr>
+              <a:t>https://</a:t>
+            </a:r>
+            <a:r>
+              <a:rPr lang="en-US" sz="800" dirty="0" err="1">
+                <a:solidFill>
+                  <a:prstClr val="black"/>
+                </a:solidFill>
+                <a:latin typeface="Helvetica Neue" panose="02000503000000020004" pitchFamily="2" charset="0"/>
+                <a:ea typeface="Helvetica Neue" panose="02000503000000020004" pitchFamily="2" charset="0"/>
+                <a:cs typeface="Helvetica Neue" panose="02000503000000020004" pitchFamily="2" charset="0"/>
+              </a:rPr>
+              <a:t>www.phillyvoice.com</a:t>
+            </a:r>
+            <a:r>
+              <a:rPr lang="en-US" sz="800" dirty="0">
+                <a:solidFill>
+                  <a:prstClr val="black"/>
+                </a:solidFill>
+                <a:latin typeface="Helvetica Neue" panose="02000503000000020004" pitchFamily="2" charset="0"/>
+                <a:ea typeface="Helvetica Neue" panose="02000503000000020004" pitchFamily="2" charset="0"/>
+                <a:cs typeface="Helvetica Neue" panose="02000503000000020004" pitchFamily="2" charset="0"/>
+              </a:rPr>
+              <a:t>/wordle-strategies-how-to-play/, https://</a:t>
+            </a:r>
+            <a:r>
+              <a:rPr lang="en-US" sz="800" dirty="0" err="1">
+                <a:solidFill>
+                  <a:prstClr val="black"/>
+                </a:solidFill>
+                <a:latin typeface="Helvetica Neue" panose="02000503000000020004" pitchFamily="2" charset="0"/>
+                <a:ea typeface="Helvetica Neue" panose="02000503000000020004" pitchFamily="2" charset="0"/>
+                <a:cs typeface="Helvetica Neue" panose="02000503000000020004" pitchFamily="2" charset="0"/>
+              </a:rPr>
+              <a:t>www.looper.com</a:t>
+            </a:r>
+            <a:r>
+              <a:rPr lang="en-US" sz="800" dirty="0">
+                <a:solidFill>
+                  <a:prstClr val="black"/>
+                </a:solidFill>
+                <a:latin typeface="Helvetica Neue" panose="02000503000000020004" pitchFamily="2" charset="0"/>
+                <a:ea typeface="Helvetica Neue" panose="02000503000000020004" pitchFamily="2" charset="0"/>
+                <a:cs typeface="Helvetica Neue" panose="02000503000000020004" pitchFamily="2" charset="0"/>
+              </a:rPr>
+              <a:t>/218228/the-wild-true-story-behind-samuel-l-jacksons-famous-jurassic-park-line/</a:t>
+            </a:r>
+          </a:p>
+        </p:txBody>
+      </p:sp>
+    </p:spTree>
+    <p:extLst>
+      <p:ext uri="{BB962C8B-B14F-4D97-AF65-F5344CB8AC3E}">
+        <p14:creationId xmlns:p14="http://schemas.microsoft.com/office/powerpoint/2010/main" val="1196489999"/>
+      </p:ext>
+    </p:extLst>
+  </p:cSld>
+  <p:clrMapOvr>
+    <a:masterClrMapping/>
+  </p:clrMapOvr>
+  <p:timing>
+    <p:tnLst>
+      <p:par>
+        <p:cTn id="1" dur="indefinite" restart="never" nodeType="tmRoot">
+          <p:childTnLst>
+            <p:seq concurrent="1" nextAc="seek">
+              <p:cTn id="2" dur="indefinite" nodeType="mainSeq">
+                <p:childTnLst>
+                  <p:par>
+                    <p:cTn id="3" fill="hold">
+                      <p:stCondLst>
+                        <p:cond delay="indefinite"/>
+                      </p:stCondLst>
+                      <p:childTnLst>
+                        <p:par>
+                          <p:cTn id="4" fill="hold">
+                            <p:stCondLst>
+                              <p:cond delay="0"/>
+                            </p:stCondLst>
+                            <p:childTnLst>
+                              <p:par>
+                                <p:cTn id="5" presetID="2" presetClass="entr" presetSubtype="4" fill="hold" nodeType="clickEffect">
+                                  <p:stCondLst>
+                                    <p:cond delay="0"/>
+                                  </p:stCondLst>
+                                  <p:childTnLst>
+                                    <p:set>
+                                      <p:cBhvr>
+                                        <p:cTn id="6" dur="1" fill="hold">
+                                          <p:stCondLst>
+                                            <p:cond delay="0"/>
+                                          </p:stCondLst>
+                                        </p:cTn>
+                                        <p:tgtEl>
+                                          <p:spTgt spid="5124"/>
+                                        </p:tgtEl>
+                                        <p:attrNameLst>
+                                          <p:attrName>style.visibility</p:attrName>
+                                        </p:attrNameLst>
+                                      </p:cBhvr>
+                                      <p:to>
+                                        <p:strVal val="visible"/>
+                                      </p:to>
+                                    </p:set>
+                                    <p:anim calcmode="lin" valueType="num">
+                                      <p:cBhvr additive="base">
+                                        <p:cTn id="7" dur="500" fill="hold"/>
+                                        <p:tgtEl>
+                                          <p:spTgt spid="5124"/>
+                                        </p:tgtEl>
+                                        <p:attrNameLst>
+                                          <p:attrName>ppt_x</p:attrName>
+                                        </p:attrNameLst>
+                                      </p:cBhvr>
+                                      <p:tavLst>
+                                        <p:tav tm="0">
+                                          <p:val>
+                                            <p:strVal val="#ppt_x"/>
+                                          </p:val>
+                                        </p:tav>
+                                        <p:tav tm="100000">
+                                          <p:val>
+                                            <p:strVal val="#ppt_x"/>
+                                          </p:val>
+                                        </p:tav>
+                                      </p:tavLst>
+                                    </p:anim>
+                                    <p:anim calcmode="lin" valueType="num">
+                                      <p:cBhvr additive="base">
+                                        <p:cTn id="8" dur="500" fill="hold"/>
+                                        <p:tgtEl>
+                                          <p:spTgt spid="5124"/>
+                                        </p:tgtEl>
+                                        <p:attrNameLst>
+                                          <p:attrName>ppt_y</p:attrName>
+                                        </p:attrNameLst>
+                                      </p:cBhvr>
+                                      <p:tavLst>
+                                        <p:tav tm="0">
+                                          <p:val>
+                                            <p:strVal val="1+#ppt_h/2"/>
+                                          </p:val>
+                                        </p:tav>
+                                        <p:tav tm="100000">
+                                          <p:val>
+                                            <p:strVal val="#ppt_y"/>
+                                          </p:val>
+                                        </p:tav>
+                                      </p:tavLst>
+                                    </p:anim>
+                                  </p:childTnLst>
+                                </p:cTn>
+                              </p:par>
+                            </p:childTnLst>
+                          </p:cTn>
+                        </p:par>
+                      </p:childTnLst>
+                    </p:cTn>
+                  </p:par>
+                </p:childTnLst>
+              </p:cTn>
+              <p:prevCondLst>
+                <p:cond evt="onPrev" delay="0">
+                  <p:tgtEl>
+                    <p:sldTgt/>
+                  </p:tgtEl>
+                </p:cond>
+              </p:prevCondLst>
+              <p:nextCondLst>
+                <p:cond evt="onNext" delay="0">
+                  <p:tgtEl>
+                    <p:sldTgt/>
+                  </p:tgtEl>
+                </p:cond>
+              </p:nextCondLst>
+            </p:seq>
+          </p:childTnLst>
+        </p:cTn>
+      </p:par>
+    </p:tnLst>
+  </p:timing>
+</p:sld>
+</file>
+
+<file path=ppt/slides/slide3.xml><?xml version="1.0" encoding="utf-8"?>
+<p:sld xmlns:a="http://schemas.openxmlformats.org/drawingml/2006/main" xmlns:r="http://schemas.openxmlformats.org/officeDocument/2006/relationships" xmlns:p="http://schemas.openxmlformats.org/presentationml/2006/main">
+  <p:cSld>
+    <p:spTree>
+      <p:nvGrpSpPr>
+        <p:cNvPr id="1" name=""/>
+        <p:cNvGrpSpPr/>
+        <p:nvPr/>
+      </p:nvGrpSpPr>
+      <p:grpSpPr>
+        <a:xfrm>
+          <a:off x="0" y="0"/>
+          <a:ext cx="0" cy="0"/>
+          <a:chOff x="0" y="0"/>
+          <a:chExt cx="0" cy="0"/>
+        </a:xfrm>
+      </p:grpSpPr>
+      <p:sp>
+        <p:nvSpPr>
+          <p:cNvPr id="4" name="Title 1"/>
+          <p:cNvSpPr txBox="1">
+            <a:spLocks/>
+          </p:cNvSpPr>
+          <p:nvPr/>
+        </p:nvSpPr>
+        <p:spPr>
+          <a:xfrm>
+            <a:off x="0" y="41589"/>
+            <a:ext cx="9144000" cy="1139825"/>
+          </a:xfrm>
+          <a:prstGeom prst="rect">
+            <a:avLst/>
+          </a:prstGeom>
+        </p:spPr>
+        <p:txBody>
+          <a:bodyPr vert="horz" lIns="91440" tIns="45720" rIns="91440" bIns="45720" rtlCol="0" anchor="ctr">
+            <a:normAutofit fontScale="92500"/>
+          </a:bodyPr>
+          <a:lstStyle>
+            <a:lvl1pPr algn="ctr" defTabSz="914400" rtl="0" eaLnBrk="1" latinLnBrk="0" hangingPunct="1">
+              <a:spcBef>
+                <a:spcPct val="0"/>
+              </a:spcBef>
+              <a:buNone/>
+              <a:defRPr sz="4400" kern="1200">
+                <a:solidFill>
+                  <a:schemeClr val="tx1"/>
+                </a:solidFill>
+                <a:latin typeface="+mj-lt"/>
+                <a:ea typeface="+mj-ea"/>
+                <a:cs typeface="+mj-cs"/>
+              </a:defRPr>
+            </a:lvl1pPr>
+          </a:lstStyle>
+          <a:p>
+            <a:pPr fontAlgn="auto">
+              <a:spcAft>
+                <a:spcPts val="0"/>
+              </a:spcAft>
+            </a:pPr>
+            <a:r>
+              <a:rPr lang="en-US" b="1" dirty="0">
+                <a:solidFill>
+                  <a:schemeClr val="tx1">
+                    <a:lumMod val="65000"/>
+                    <a:lumOff val="35000"/>
+                  </a:schemeClr>
+                </a:solidFill>
+                <a:latin typeface="Garamond" panose="02020404030301010803" pitchFamily="18" charset="0"/>
+              </a:rPr>
+              <a:t>Open questions from last week (2023) 2</a:t>
             </a:r>
           </a:p>
         </p:txBody>

</xml_diff>